<commit_message>
Implemented hybrid split for data, further extended presentation
</commit_message>
<xml_diff>
--- a/Verticox.pptx
+++ b/Verticox.pptx
@@ -29,15 +29,15 @@
   <p:notesSz cx="6858000" cy="9144000"/>
   <p:embeddedFontLst>
     <p:embeddedFont>
-      <p:font typeface="Lato Black" panose="020B0604020202020204" charset="0"/>
-      <p:bold r:id="rId19"/>
-      <p:boldItalic r:id="rId20"/>
+      <p:font typeface="Calibri" panose="020F0502020204030204" pitchFamily="34" charset="0"/>
+      <p:regular r:id="rId19"/>
+      <p:bold r:id="rId20"/>
+      <p:italic r:id="rId21"/>
+      <p:boldItalic r:id="rId22"/>
     </p:embeddedFont>
     <p:embeddedFont>
-      <p:font typeface="Calibri" panose="020F0502020204030204" pitchFamily="34" charset="0"/>
-      <p:regular r:id="rId21"/>
-      <p:bold r:id="rId22"/>
-      <p:italic r:id="rId23"/>
+      <p:font typeface="Lato Black" panose="020B0604020202020204" charset="0"/>
+      <p:bold r:id="rId23"/>
       <p:boldItalic r:id="rId24"/>
     </p:embeddedFont>
     <p:embeddedFont>
@@ -8541,15 +8541,7 @@
             </a:r>
             <a:r>
               <a:rPr lang="en-US" sz="1600" dirty="0" smtClean="0"/>
-              <a:t> can deal with</a:t>
-            </a:r>
-            <a:r>
-              <a:rPr lang="en-US" sz="1600" dirty="0" smtClean="0"/>
-              <a:t> </a:t>
-            </a:r>
-            <a:r>
-              <a:rPr lang="en-US" sz="1600" dirty="0" smtClean="0"/>
-              <a:t>a hybrid </a:t>
+              <a:t> can deal with a hybrid </a:t>
             </a:r>
             <a:r>
               <a:rPr lang="en-US" sz="1600" dirty="0" err="1" smtClean="0"/>
@@ -8561,13 +8553,8 @@
             <a:pPr lvl="2"/>
             <a:r>
               <a:rPr lang="en-US" sz="1600" dirty="0" smtClean="0"/>
-              <a:t>If not: s</a:t>
+              <a:t>If not: split local update into several privacy preserving protocols</a:t>
             </a:r>
-            <a:r>
-              <a:rPr lang="en-US" sz="1600" dirty="0" smtClean="0"/>
-              <a:t>plit local update into several privacy preserving protocols</a:t>
-            </a:r>
-            <a:endParaRPr lang="en-US" sz="1600" dirty="0" smtClean="0"/>
           </a:p>
           <a:p>
             <a:pPr lvl="1"/>
@@ -10961,17 +10948,45 @@
               <a:bodyPr/>
               <a:lstStyle/>
               <a:p>
+                <a:r>
+                  <a:rPr lang="en-US" sz="800" i="1" dirty="0" smtClean="0">
+                    <a:latin typeface="Lato Light" panose="020B0604020202020204" charset="0"/>
+                    <a:ea typeface="Cambria Math" panose="02040503050406030204" pitchFamily="18" charset="0"/>
+                  </a:rPr>
+                  <a:t>Create a virtual data-owner for the hybrid attributes, and only the hybrid predictors</a:t>
+                </a:r>
+              </a:p>
+              <a:p>
+                <a:r>
+                  <a:rPr lang="en-US" sz="800" i="1" dirty="0" smtClean="0">
+                    <a:latin typeface="Lato Light" panose="020B0604020202020204" charset="0"/>
+                    <a:ea typeface="Cambria Math" panose="02040503050406030204" pitchFamily="18" charset="0"/>
+                  </a:rPr>
+                  <a:t>All non-hybrid predictors should be treated as normal</a:t>
+                </a:r>
+                <a:endParaRPr lang="en-US" sz="800" i="1" dirty="0" smtClean="0">
+                  <a:latin typeface="Lato Light" panose="020B0604020202020204" charset="0"/>
+                  <a:ea typeface="Cambria Math" panose="02040503050406030204" pitchFamily="18" charset="0"/>
+                </a:endParaRPr>
+              </a:p>
+              <a:p>
+                <a:endParaRPr lang="en-US" sz="800" b="0" i="1" dirty="0" smtClean="0">
+                  <a:latin typeface="Lato Light" panose="020B0604020202020204" charset="0"/>
+                  <a:ea typeface="Cambria Math" panose="02040503050406030204" pitchFamily="18" charset="0"/>
+                </a:endParaRPr>
+              </a:p>
+              <a:p>
                 <a14:m>
                   <m:oMath xmlns:m="http://schemas.openxmlformats.org/officeDocument/2006/math">
                     <m:r>
-                      <a:rPr lang="en-US" sz="900" b="0" i="1" smtClean="0">
+                      <a:rPr lang="en-US" sz="800" b="0" i="1" smtClean="0">
                         <a:latin typeface="Cambria Math" panose="02040503050406030204" pitchFamily="18" charset="0"/>
                         <a:ea typeface="Cambria Math" panose="02040503050406030204" pitchFamily="18" charset="0"/>
                       </a:rPr>
                       <m:t>𝐴</m:t>
                     </m:r>
                     <m:r>
-                      <a:rPr lang="en-US" sz="900" b="0" i="1" smtClean="0">
+                      <a:rPr lang="en-US" sz="800" b="0" i="1" smtClean="0">
                         <a:latin typeface="Cambria Math" panose="02040503050406030204" pitchFamily="18" charset="0"/>
                         <a:ea typeface="Cambria Math" panose="02040503050406030204" pitchFamily="18" charset="0"/>
                       </a:rPr>
@@ -10980,7 +10995,7 @@
                     <m:sSup>
                       <m:sSupPr>
                         <m:ctrlPr>
-                          <a:rPr lang="en-US" sz="900" i="1">
+                          <a:rPr lang="en-US" sz="800" i="1">
                             <a:latin typeface="Cambria Math" panose="02040503050406030204" pitchFamily="18" charset="0"/>
                             <a:ea typeface="Cambria Math" panose="02040503050406030204" pitchFamily="18" charset="0"/>
                           </a:rPr>
@@ -10992,27 +11007,27 @@
                             <m:begChr m:val="["/>
                             <m:endChr m:val="]"/>
                             <m:ctrlPr>
-                              <a:rPr lang="en-US" sz="900" i="1">
+                              <a:rPr lang="en-US" sz="800" i="1">
                                 <a:latin typeface="Cambria Math" panose="02040503050406030204" pitchFamily="18" charset="0"/>
                               </a:rPr>
                             </m:ctrlPr>
                           </m:dPr>
                           <m:e>
                             <m:r>
-                              <a:rPr lang="en-US" sz="900" i="1">
+                              <a:rPr lang="en-US" sz="800" i="1">
                                 <a:latin typeface="Cambria Math" panose="02040503050406030204" pitchFamily="18" charset="0"/>
                               </a:rPr>
                               <m:t> </m:t>
                             </m:r>
                             <m:r>
-                              <a:rPr lang="en-US" sz="900" i="1">
+                              <a:rPr lang="en-US" sz="800" i="1">
                                 <a:latin typeface="Cambria Math" panose="02040503050406030204" pitchFamily="18" charset="0"/>
                                 <a:ea typeface="Cambria Math" panose="02040503050406030204" pitchFamily="18" charset="0"/>
                               </a:rPr>
                               <m:t>𝜌</m:t>
                             </m:r>
                             <m:r>
-                              <a:rPr lang="en-US" sz="900" i="1">
+                              <a:rPr lang="en-US" sz="800" i="1">
                                 <a:latin typeface="Cambria Math" panose="02040503050406030204" pitchFamily="18" charset="0"/>
                                 <a:ea typeface="Cambria Math" panose="02040503050406030204" pitchFamily="18" charset="0"/>
                               </a:rPr>
@@ -11021,7 +11036,7 @@
                             <m:sSub>
                               <m:sSubPr>
                                 <m:ctrlPr>
-                                  <a:rPr lang="en-US" sz="900" i="1">
+                                  <a:rPr lang="en-US" sz="800" i="1">
                                     <a:latin typeface="Cambria Math" panose="02040503050406030204" pitchFamily="18" charset="0"/>
                                     <a:ea typeface="Cambria Math" panose="02040503050406030204" pitchFamily="18" charset="0"/>
                                   </a:rPr>
@@ -11029,7 +11044,7 @@
                               </m:sSubPr>
                               <m:e>
                                 <m:r>
-                                  <a:rPr lang="en-US" sz="900" i="1">
+                                  <a:rPr lang="en-US" sz="800" i="1">
                                     <a:latin typeface="Cambria Math" panose="02040503050406030204" pitchFamily="18" charset="0"/>
                                     <a:ea typeface="Cambria Math" panose="02040503050406030204" pitchFamily="18" charset="0"/>
                                   </a:rPr>
@@ -11038,7 +11053,7 @@
                               </m:e>
                               <m:sub>
                                 <m:r>
-                                  <a:rPr lang="en-US" sz="900" i="1">
+                                  <a:rPr lang="en-US" sz="800" i="1">
                                     <a:latin typeface="Cambria Math" panose="02040503050406030204" pitchFamily="18" charset="0"/>
                                     <a:ea typeface="Cambria Math" panose="02040503050406030204" pitchFamily="18" charset="0"/>
                                   </a:rPr>
@@ -11049,7 +11064,7 @@
                             <m:sSubSup>
                               <m:sSubSupPr>
                                 <m:ctrlPr>
-                                  <a:rPr lang="en-US" sz="900" i="1">
+                                  <a:rPr lang="en-US" sz="800" i="1">
                                     <a:latin typeface="Cambria Math" panose="02040503050406030204" pitchFamily="18" charset="0"/>
                                     <a:ea typeface="Cambria Math" panose="02040503050406030204" pitchFamily="18" charset="0"/>
                                   </a:rPr>
@@ -11057,7 +11072,7 @@
                               </m:sSubSupPr>
                               <m:e>
                                 <m:r>
-                                  <a:rPr lang="en-US" sz="900" i="1">
+                                  <a:rPr lang="en-US" sz="800" i="1">
                                     <a:latin typeface="Cambria Math" panose="02040503050406030204" pitchFamily="18" charset="0"/>
                                     <a:ea typeface="Cambria Math" panose="02040503050406030204" pitchFamily="18" charset="0"/>
                                   </a:rPr>
@@ -11066,7 +11081,7 @@
                               </m:e>
                               <m:sub>
                                 <m:r>
-                                  <a:rPr lang="en-US" sz="900" i="1">
+                                  <a:rPr lang="en-US" sz="800" i="1">
                                     <a:latin typeface="Cambria Math" panose="02040503050406030204" pitchFamily="18" charset="0"/>
                                     <a:ea typeface="Cambria Math" panose="02040503050406030204" pitchFamily="18" charset="0"/>
                                   </a:rPr>
@@ -11075,7 +11090,7 @@
                               </m:sub>
                               <m:sup>
                                 <m:r>
-                                  <a:rPr lang="en-US" sz="900" i="1">
+                                  <a:rPr lang="en-US" sz="800" i="1">
                                     <a:latin typeface="Cambria Math" panose="02040503050406030204" pitchFamily="18" charset="0"/>
                                     <a:ea typeface="Cambria Math" panose="02040503050406030204" pitchFamily="18" charset="0"/>
                                   </a:rPr>
@@ -11088,7 +11103,7 @@
                       </m:e>
                       <m:sup>
                         <m:r>
-                          <a:rPr lang="en-US" sz="900" i="1">
+                          <a:rPr lang="en-US" sz="800" i="1">
                             <a:latin typeface="Cambria Math" panose="02040503050406030204" pitchFamily="18" charset="0"/>
                             <a:ea typeface="Cambria Math" panose="02040503050406030204" pitchFamily="18" charset="0"/>
                           </a:rPr>
@@ -11098,14 +11113,14 @@
                     </m:sSup>
                   </m:oMath>
                 </a14:m>
-                <a:endParaRPr lang="en-US" sz="900" dirty="0" smtClean="0">
+                <a:endParaRPr lang="en-US" sz="800" dirty="0" smtClean="0">
                   <a:ea typeface="Cambria Math" panose="02040503050406030204" pitchFamily="18" charset="0"/>
                 </a:endParaRPr>
               </a:p>
               <a:p>
                 <a:pPr lvl="1"/>
                 <a:r>
-                  <a:rPr lang="en-US" sz="900" dirty="0" smtClean="0">
+                  <a:rPr lang="en-US" sz="800" dirty="0" smtClean="0">
                     <a:ea typeface="Cambria Math" panose="02040503050406030204" pitchFamily="18" charset="0"/>
                   </a:rPr>
                   <a:t>Divide </a:t>
@@ -11115,7 +11130,7 @@
                     <m:sSub>
                       <m:sSubPr>
                         <m:ctrlPr>
-                          <a:rPr lang="en-US" sz="900" i="1">
+                          <a:rPr lang="en-US" sz="800" i="1">
                             <a:latin typeface="Cambria Math" panose="02040503050406030204" pitchFamily="18" charset="0"/>
                             <a:ea typeface="Cambria Math" panose="02040503050406030204" pitchFamily="18" charset="0"/>
                           </a:rPr>
@@ -11123,7 +11138,7 @@
                       </m:sSubPr>
                       <m:e>
                         <m:r>
-                          <a:rPr lang="en-US" sz="900" i="1">
+                          <a:rPr lang="en-US" sz="800" i="1">
                             <a:latin typeface="Cambria Math" panose="02040503050406030204" pitchFamily="18" charset="0"/>
                             <a:ea typeface="Cambria Math" panose="02040503050406030204" pitchFamily="18" charset="0"/>
                           </a:rPr>
@@ -11132,7 +11147,7 @@
                       </m:e>
                       <m:sub>
                         <m:r>
-                          <a:rPr lang="en-US" sz="900" i="1">
+                          <a:rPr lang="en-US" sz="800" i="1">
                             <a:latin typeface="Cambria Math" panose="02040503050406030204" pitchFamily="18" charset="0"/>
                             <a:ea typeface="Cambria Math" panose="02040503050406030204" pitchFamily="18" charset="0"/>
                           </a:rPr>
@@ -11143,7 +11158,7 @@
                     <m:sSubSup>
                       <m:sSubSupPr>
                         <m:ctrlPr>
-                          <a:rPr lang="en-US" sz="900" i="1">
+                          <a:rPr lang="en-US" sz="800" i="1">
                             <a:latin typeface="Cambria Math" panose="02040503050406030204" pitchFamily="18" charset="0"/>
                             <a:ea typeface="Cambria Math" panose="02040503050406030204" pitchFamily="18" charset="0"/>
                           </a:rPr>
@@ -11151,7 +11166,7 @@
                       </m:sSubSupPr>
                       <m:e>
                         <m:r>
-                          <a:rPr lang="en-US" sz="900" i="1">
+                          <a:rPr lang="en-US" sz="800" i="1">
                             <a:latin typeface="Cambria Math" panose="02040503050406030204" pitchFamily="18" charset="0"/>
                             <a:ea typeface="Cambria Math" panose="02040503050406030204" pitchFamily="18" charset="0"/>
                           </a:rPr>
@@ -11160,7 +11175,7 @@
                       </m:e>
                       <m:sub>
                         <m:r>
-                          <a:rPr lang="en-US" sz="900" i="1">
+                          <a:rPr lang="en-US" sz="800" i="1">
                             <a:latin typeface="Cambria Math" panose="02040503050406030204" pitchFamily="18" charset="0"/>
                             <a:ea typeface="Cambria Math" panose="02040503050406030204" pitchFamily="18" charset="0"/>
                           </a:rPr>
@@ -11169,7 +11184,7 @@
                       </m:sub>
                       <m:sup>
                         <m:r>
-                          <a:rPr lang="en-US" sz="900" i="1">
+                          <a:rPr lang="en-US" sz="800" i="1">
                             <a:latin typeface="Cambria Math" panose="02040503050406030204" pitchFamily="18" charset="0"/>
                             <a:ea typeface="Cambria Math" panose="02040503050406030204" pitchFamily="18" charset="0"/>
                           </a:rPr>
@@ -11180,7 +11195,7 @@
                   </m:oMath>
                 </a14:m>
                 <a:r>
-                  <a:rPr lang="en-US" sz="900" dirty="0" smtClean="0">
+                  <a:rPr lang="en-US" sz="800" dirty="0" smtClean="0">
                     <a:ea typeface="Cambria Math" panose="02040503050406030204" pitchFamily="18" charset="0"/>
                   </a:rPr>
                   <a:t> into the multiplication of it’s individual scalar products.</a:t>
@@ -11189,44 +11204,70 @@
               <a:p>
                 <a:pPr lvl="1"/>
                 <a:r>
-                  <a:rPr lang="en-US" sz="900" dirty="0" smtClean="0">
+                  <a:rPr lang="en-US" sz="800" dirty="0" smtClean="0">
                     <a:ea typeface="Cambria Math" panose="02040503050406030204" pitchFamily="18" charset="0"/>
                   </a:rPr>
-                  <a:t>Calculate these using a n-party </a:t>
+                  <a:t>Calculate these using a n-party SSP where locally unknown values are set to 1 in the vectors used. </a:t>
+                </a:r>
+                <a14:m>
+                  <m:oMath xmlns:m="http://schemas.openxmlformats.org/officeDocument/2006/math">
+                    <m:r>
+                      <a:rPr lang="en-US" sz="800" i="1" dirty="0" smtClean="0">
+                        <a:latin typeface="Cambria Math" panose="02040503050406030204" pitchFamily="18" charset="0"/>
+                        <a:ea typeface="Cambria Math" panose="02040503050406030204" pitchFamily="18" charset="0"/>
+                      </a:rPr>
+                      <m:t>𝐴</m:t>
+                    </m:r>
+                  </m:oMath>
+                </a14:m>
+                <a:r>
+                  <a:rPr lang="en-US" sz="800" dirty="0" smtClean="0">
+                    <a:ea typeface="Cambria Math" panose="02040503050406030204" pitchFamily="18" charset="0"/>
+                  </a:rPr>
+                  <a:t> can be given the </a:t>
                 </a:r>
                 <a:r>
-                  <a:rPr lang="en-US" sz="900" dirty="0" smtClean="0">
+                  <a:rPr lang="en-US" sz="800" dirty="0" err="1" smtClean="0">
                     <a:ea typeface="Cambria Math" panose="02040503050406030204" pitchFamily="18" charset="0"/>
                   </a:rPr>
-                  <a:t>SSP where locally unknown values are set to 1 in the vectors used. </a:t>
+                  <a:t>the</a:t>
                 </a:r>
                 <a:r>
-                  <a:rPr lang="en-US" sz="900" dirty="0" smtClean="0">
+                  <a:rPr lang="en-US" sz="800" dirty="0" smtClean="0">
                     <a:ea typeface="Cambria Math" panose="02040503050406030204" pitchFamily="18" charset="0"/>
                   </a:rPr>
-                  <a:t>The sub-results can be stored in an auxiliary party. </a:t>
+                  <a:t> virtual data-owner</a:t>
+                </a:r>
+              </a:p>
+              <a:p>
+                <a:pPr lvl="1"/>
+                <a:r>
+                  <a:rPr lang="en-US" sz="800" dirty="0" smtClean="0">
+                    <a:ea typeface="Cambria Math" panose="02040503050406030204" pitchFamily="18" charset="0"/>
+                  </a:rPr>
+                  <a:t>Do this in parallel to reduce time complexity</a:t>
                 </a:r>
                 <a:r>
-                  <a:rPr lang="en-US" sz="900" dirty="0" smtClean="0"/>
+                  <a:rPr lang="en-US" sz="800" dirty="0" smtClean="0"/>
                   <a:t/>
                 </a:r>
                 <a:br>
-                  <a:rPr lang="en-US" sz="900" dirty="0" smtClean="0"/>
+                  <a:rPr lang="en-US" sz="800" dirty="0" smtClean="0"/>
                 </a:br>
-                <a:endParaRPr lang="nl-NL" sz="900" dirty="0" smtClean="0"/>
+                <a:endParaRPr lang="nl-NL" sz="800" dirty="0" smtClean="0"/>
               </a:p>
               <a:p>
                 <a14:m>
                   <m:oMath xmlns:m="http://schemas.openxmlformats.org/officeDocument/2006/math">
                     <m:r>
-                      <a:rPr lang="en-US" sz="900" b="0" i="1" smtClean="0">
+                      <a:rPr lang="en-US" sz="800" b="0" i="1" smtClean="0">
                         <a:latin typeface="Cambria Math" panose="02040503050406030204" pitchFamily="18" charset="0"/>
                         <a:ea typeface="Cambria Math" panose="02040503050406030204" pitchFamily="18" charset="0"/>
                       </a:rPr>
                       <m:t>𝐵</m:t>
                     </m:r>
                     <m:r>
-                      <a:rPr lang="en-US" sz="900" b="0" i="1" smtClean="0">
+                      <a:rPr lang="en-US" sz="800" b="0" i="1" smtClean="0">
                         <a:latin typeface="Cambria Math" panose="02040503050406030204" pitchFamily="18" charset="0"/>
                         <a:ea typeface="Cambria Math" panose="02040503050406030204" pitchFamily="18" charset="0"/>
                       </a:rPr>
@@ -11237,7 +11278,7 @@
                         <m:begChr m:val="["/>
                         <m:endChr m:val="]"/>
                         <m:ctrlPr>
-                          <a:rPr lang="en-US" sz="900" i="1">
+                          <a:rPr lang="en-US" sz="800" i="1">
                             <a:latin typeface="Cambria Math" panose="02040503050406030204" pitchFamily="18" charset="0"/>
                             <a:ea typeface="Cambria Math" panose="02040503050406030204" pitchFamily="18" charset="0"/>
                           </a:rPr>
@@ -11245,7 +11286,7 @@
                       </m:dPr>
                       <m:e>
                         <m:r>
-                          <a:rPr lang="en-US" sz="900" i="1">
+                          <a:rPr lang="en-US" sz="800" i="1">
                             <a:latin typeface="Cambria Math" panose="02040503050406030204" pitchFamily="18" charset="0"/>
                           </a:rPr>
                           <m:t> </m:t>
@@ -11254,7 +11295,7 @@
                           <m:naryPr>
                             <m:chr m:val="∑"/>
                             <m:ctrlPr>
-                              <a:rPr lang="en-US" sz="900" i="1">
+                              <a:rPr lang="en-US" sz="800" i="1">
                                 <a:latin typeface="Cambria Math" panose="02040503050406030204" pitchFamily="18" charset="0"/>
                                 <a:ea typeface="Cambria Math" panose="02040503050406030204" pitchFamily="18" charset="0"/>
                               </a:rPr>
@@ -11265,14 +11306,14 @@
                               <m:rPr>
                                 <m:brk m:alnAt="23"/>
                               </m:rPr>
-                              <a:rPr lang="en-US" sz="900" i="1">
+                              <a:rPr lang="en-US" sz="800" i="1">
                                 <a:latin typeface="Cambria Math" panose="02040503050406030204" pitchFamily="18" charset="0"/>
                                 <a:ea typeface="Cambria Math" panose="02040503050406030204" pitchFamily="18" charset="0"/>
                               </a:rPr>
                               <m:t>𝑛</m:t>
                             </m:r>
                             <m:r>
-                              <a:rPr lang="en-US" sz="900" i="1">
+                              <a:rPr lang="en-US" sz="800" i="1">
                                 <a:latin typeface="Cambria Math" panose="02040503050406030204" pitchFamily="18" charset="0"/>
                                 <a:ea typeface="Cambria Math" panose="02040503050406030204" pitchFamily="18" charset="0"/>
                               </a:rPr>
@@ -11281,7 +11322,7 @@
                           </m:sub>
                           <m:sup>
                             <m:r>
-                              <a:rPr lang="en-US" sz="900" i="1">
+                              <a:rPr lang="en-US" sz="800" i="1">
                                 <a:latin typeface="Cambria Math" panose="02040503050406030204" pitchFamily="18" charset="0"/>
                                 <a:ea typeface="Cambria Math" panose="02040503050406030204" pitchFamily="18" charset="0"/>
                               </a:rPr>
@@ -11292,7 +11333,7 @@
                             <m:d>
                               <m:dPr>
                                 <m:ctrlPr>
-                                  <a:rPr lang="en-US" sz="900" i="1">
+                                  <a:rPr lang="en-US" sz="800" i="1">
                                     <a:latin typeface="Cambria Math" panose="02040503050406030204" pitchFamily="18" charset="0"/>
                                     <a:ea typeface="Cambria Math" panose="02040503050406030204" pitchFamily="18" charset="0"/>
                                   </a:rPr>
@@ -11300,7 +11341,7 @@
                               </m:dPr>
                               <m:e>
                                 <m:r>
-                                  <a:rPr lang="en-US" sz="900" i="1">
+                                  <a:rPr lang="en-US" sz="800" i="1">
                                     <a:latin typeface="Cambria Math" panose="02040503050406030204" pitchFamily="18" charset="0"/>
                                     <a:ea typeface="Cambria Math" panose="02040503050406030204" pitchFamily="18" charset="0"/>
                                   </a:rPr>
@@ -11309,7 +11350,7 @@
                                 <m:sSubSup>
                                   <m:sSubSupPr>
                                     <m:ctrlPr>
-                                      <a:rPr lang="en-US" sz="900" i="1">
+                                      <a:rPr lang="en-US" sz="800" i="1">
                                         <a:latin typeface="Cambria Math" panose="02040503050406030204" pitchFamily="18" charset="0"/>
                                         <a:ea typeface="Cambria Math" panose="02040503050406030204" pitchFamily="18" charset="0"/>
                                       </a:rPr>
@@ -11317,7 +11358,7 @@
                                   </m:sSubSupPr>
                                   <m:e>
                                     <m:r>
-                                      <a:rPr lang="en-US" sz="900" i="1">
+                                      <a:rPr lang="en-US" sz="800" i="1">
                                         <a:latin typeface="Cambria Math" panose="02040503050406030204" pitchFamily="18" charset="0"/>
                                         <a:ea typeface="Cambria Math" panose="02040503050406030204" pitchFamily="18" charset="0"/>
                                       </a:rPr>
@@ -11326,7 +11367,7 @@
                                   </m:e>
                                   <m:sub>
                                     <m:r>
-                                      <a:rPr lang="en-US" sz="900" i="1">
+                                      <a:rPr lang="en-US" sz="800" i="1">
                                         <a:latin typeface="Cambria Math" panose="02040503050406030204" pitchFamily="18" charset="0"/>
                                         <a:ea typeface="Cambria Math" panose="02040503050406030204" pitchFamily="18" charset="0"/>
                                       </a:rPr>
@@ -11335,14 +11376,14 @@
                                   </m:sub>
                                   <m:sup>
                                     <m:r>
-                                      <a:rPr lang="en-US" sz="900" i="1">
+                                      <a:rPr lang="en-US" sz="800" i="1">
                                         <a:latin typeface="Cambria Math" panose="02040503050406030204" pitchFamily="18" charset="0"/>
                                         <a:ea typeface="Cambria Math" panose="02040503050406030204" pitchFamily="18" charset="0"/>
                                       </a:rPr>
                                       <m:t>𝑝</m:t>
                                     </m:r>
                                     <m:r>
-                                      <a:rPr lang="en-US" sz="900" i="1">
+                                      <a:rPr lang="en-US" sz="800" i="1">
                                         <a:latin typeface="Cambria Math" panose="02040503050406030204" pitchFamily="18" charset="0"/>
                                         <a:ea typeface="Cambria Math" panose="02040503050406030204" pitchFamily="18" charset="0"/>
                                       </a:rPr>
@@ -11351,7 +11392,7 @@
                                   </m:sup>
                                 </m:sSubSup>
                                 <m:r>
-                                  <a:rPr lang="en-US" sz="900" i="1">
+                                  <a:rPr lang="en-US" sz="800" i="1">
                                     <a:latin typeface="Cambria Math" panose="02040503050406030204" pitchFamily="18" charset="0"/>
                                     <a:ea typeface="Cambria Math" panose="02040503050406030204" pitchFamily="18" charset="0"/>
                                   </a:rPr>
@@ -11360,7 +11401,7 @@
                                 <m:sSubSup>
                                   <m:sSubSupPr>
                                     <m:ctrlPr>
-                                      <a:rPr lang="en-US" sz="900" i="1">
+                                      <a:rPr lang="en-US" sz="800" i="1">
                                         <a:latin typeface="Cambria Math" panose="02040503050406030204" pitchFamily="18" charset="0"/>
                                         <a:ea typeface="Cambria Math" panose="02040503050406030204" pitchFamily="18" charset="0"/>
                                       </a:rPr>
@@ -11368,7 +11409,7 @@
                                   </m:sSubSupPr>
                                   <m:e>
                                     <m:r>
-                                      <a:rPr lang="en-US" sz="900" i="1">
+                                      <a:rPr lang="en-US" sz="800" i="1">
                                         <a:latin typeface="Cambria Math" panose="02040503050406030204" pitchFamily="18" charset="0"/>
                                         <a:ea typeface="Cambria Math" panose="02040503050406030204" pitchFamily="18" charset="0"/>
                                       </a:rPr>
@@ -11377,7 +11418,7 @@
                                   </m:e>
                                   <m:sub>
                                     <m:r>
-                                      <a:rPr lang="en-US" sz="900" i="1">
+                                      <a:rPr lang="en-US" sz="800" i="1">
                                         <a:latin typeface="Cambria Math" panose="02040503050406030204" pitchFamily="18" charset="0"/>
                                         <a:ea typeface="Cambria Math" panose="02040503050406030204" pitchFamily="18" charset="0"/>
                                       </a:rPr>
@@ -11386,14 +11427,14 @@
                                   </m:sub>
                                   <m:sup>
                                     <m:r>
-                                      <a:rPr lang="en-US" sz="900" i="1">
+                                      <a:rPr lang="en-US" sz="800" i="1">
                                         <a:latin typeface="Cambria Math" panose="02040503050406030204" pitchFamily="18" charset="0"/>
                                         <a:ea typeface="Cambria Math" panose="02040503050406030204" pitchFamily="18" charset="0"/>
                                       </a:rPr>
                                       <m:t>𝑝</m:t>
                                     </m:r>
                                     <m:r>
-                                      <a:rPr lang="en-US" sz="900" i="1">
+                                      <a:rPr lang="en-US" sz="800" i="1">
                                         <a:latin typeface="Cambria Math" panose="02040503050406030204" pitchFamily="18" charset="0"/>
                                         <a:ea typeface="Cambria Math" panose="02040503050406030204" pitchFamily="18" charset="0"/>
                                       </a:rPr>
@@ -11408,7 +11449,7 @@
                         <m:sSub>
                           <m:sSubPr>
                             <m:ctrlPr>
-                              <a:rPr lang="en-US" sz="900" i="1">
+                              <a:rPr lang="en-US" sz="800" i="1">
                                 <a:latin typeface="Cambria Math" panose="02040503050406030204" pitchFamily="18" charset="0"/>
                                 <a:ea typeface="Cambria Math" panose="02040503050406030204" pitchFamily="18" charset="0"/>
                               </a:rPr>
@@ -11416,7 +11457,7 @@
                           </m:sSubPr>
                           <m:e>
                             <m:r>
-                              <a:rPr lang="en-US" sz="900" i="1">
+                              <a:rPr lang="en-US" sz="800" i="1">
                                 <a:latin typeface="Cambria Math" panose="02040503050406030204" pitchFamily="18" charset="0"/>
                                 <a:ea typeface="Cambria Math" panose="02040503050406030204" pitchFamily="18" charset="0"/>
                               </a:rPr>
@@ -11425,7 +11466,7 @@
                           </m:e>
                           <m:sub>
                             <m:r>
-                              <a:rPr lang="en-US" sz="900" i="1">
+                              <a:rPr lang="en-US" sz="800" i="1">
                                 <a:latin typeface="Cambria Math" panose="02040503050406030204" pitchFamily="18" charset="0"/>
                                 <a:ea typeface="Cambria Math" panose="02040503050406030204" pitchFamily="18" charset="0"/>
                               </a:rPr>
@@ -11434,7 +11475,7 @@
                           </m:sub>
                         </m:sSub>
                         <m:r>
-                          <a:rPr lang="en-US" sz="900" i="1">
+                          <a:rPr lang="en-US" sz="800" i="1">
                             <a:latin typeface="Cambria Math" panose="02040503050406030204" pitchFamily="18" charset="0"/>
                             <a:ea typeface="Cambria Math" panose="02040503050406030204" pitchFamily="18" charset="0"/>
                           </a:rPr>
@@ -11443,7 +11484,7 @@
                         <m:sSub>
                           <m:sSubPr>
                             <m:ctrlPr>
-                              <a:rPr lang="en-US" sz="900" i="1">
+                              <a:rPr lang="en-US" sz="800" i="1">
                                 <a:latin typeface="Cambria Math" panose="02040503050406030204" pitchFamily="18" charset="0"/>
                                 <a:ea typeface="Cambria Math" panose="02040503050406030204" pitchFamily="18" charset="0"/>
                               </a:rPr>
@@ -11451,7 +11492,7 @@
                           </m:sSubPr>
                           <m:e>
                             <m:r>
-                              <a:rPr lang="en-US" sz="900" i="1">
+                              <a:rPr lang="en-US" sz="800" i="1">
                                 <a:latin typeface="Cambria Math" panose="02040503050406030204" pitchFamily="18" charset="0"/>
                                 <a:ea typeface="Cambria Math" panose="02040503050406030204" pitchFamily="18" charset="0"/>
                               </a:rPr>
@@ -11460,7 +11501,7 @@
                           </m:e>
                           <m:sub>
                             <m:r>
-                              <a:rPr lang="en-US" sz="900" i="1">
+                              <a:rPr lang="en-US" sz="800" i="1">
                                 <a:latin typeface="Cambria Math" panose="02040503050406030204" pitchFamily="18" charset="0"/>
                                 <a:ea typeface="Cambria Math" panose="02040503050406030204" pitchFamily="18" charset="0"/>
                               </a:rPr>
@@ -11469,7 +11510,7 @@
                           </m:sub>
                         </m:sSub>
                         <m:r>
-                          <a:rPr lang="en-US" sz="900" i="1">
+                          <a:rPr lang="en-US" sz="800" i="1">
                             <a:latin typeface="Cambria Math" panose="02040503050406030204" pitchFamily="18" charset="0"/>
                             <a:ea typeface="Cambria Math" panose="02040503050406030204" pitchFamily="18" charset="0"/>
                           </a:rPr>
@@ -11478,14 +11519,14 @@
                         <m:sSubSup>
                           <m:sSubSupPr>
                             <m:ctrlPr>
-                              <a:rPr lang="en-US" sz="900" i="1">
+                              <a:rPr lang="en-US" sz="800" i="1">
                                 <a:latin typeface="Cambria Math" panose="02040503050406030204" pitchFamily="18" charset="0"/>
                               </a:rPr>
                             </m:ctrlPr>
                           </m:sSubSupPr>
                           <m:e>
                             <m:r>
-                              <a:rPr lang="en-US" sz="900" i="1">
+                              <a:rPr lang="en-US" sz="800" i="1">
                                 <a:latin typeface="Cambria Math" panose="02040503050406030204" pitchFamily="18" charset="0"/>
                               </a:rPr>
                               <m:t>𝑉</m:t>
@@ -11493,7 +11534,7 @@
                           </m:e>
                           <m:sub>
                             <m:r>
-                              <a:rPr lang="en-US" sz="900" i="1">
+                              <a:rPr lang="en-US" sz="800" i="1">
                                 <a:latin typeface="Cambria Math" panose="02040503050406030204" pitchFamily="18" charset="0"/>
                               </a:rPr>
                               <m:t>𝑝</m:t>
@@ -11501,13 +11542,13 @@
                           </m:sub>
                           <m:sup>
                             <m:r>
-                              <a:rPr lang="en-US" sz="900" i="1">
+                              <a:rPr lang="en-US" sz="800" i="1">
                                 <a:latin typeface="Cambria Math" panose="02040503050406030204" pitchFamily="18" charset="0"/>
                               </a:rPr>
                               <m:t>𝑡</m:t>
                             </m:r>
                             <m:r>
-                              <a:rPr lang="en-US" sz="900" i="1">
+                              <a:rPr lang="en-US" sz="800" i="1">
                                 <a:latin typeface="Cambria Math" panose="02040503050406030204" pitchFamily="18" charset="0"/>
                                 <a:ea typeface="Cambria Math" panose="02040503050406030204" pitchFamily="18" charset="0"/>
                               </a:rPr>
@@ -11518,7 +11559,7 @@
                                 <m:begChr m:val="["/>
                                 <m:endChr m:val="]"/>
                                 <m:ctrlPr>
-                                  <a:rPr lang="en-US" sz="900" i="1">
+                                  <a:rPr lang="en-US" sz="800" i="1">
                                     <a:latin typeface="Cambria Math" panose="02040503050406030204" pitchFamily="18" charset="0"/>
                                     <a:ea typeface="Cambria Math" panose="02040503050406030204" pitchFamily="18" charset="0"/>
                                   </a:rPr>
@@ -11526,14 +11567,14 @@
                               </m:dPr>
                               <m:e>
                                 <m:r>
-                                  <a:rPr lang="en-US" sz="900" i="1">
+                                  <a:rPr lang="en-US" sz="800" i="1">
                                     <a:latin typeface="Cambria Math" panose="02040503050406030204" pitchFamily="18" charset="0"/>
                                     <a:ea typeface="Cambria Math" panose="02040503050406030204" pitchFamily="18" charset="0"/>
                                   </a:rPr>
                                   <m:t>1,</m:t>
                                 </m:r>
                                 <m:r>
-                                  <a:rPr lang="en-US" sz="900" i="1">
+                                  <a:rPr lang="en-US" sz="800" i="1">
                                     <a:latin typeface="Cambria Math" panose="02040503050406030204" pitchFamily="18" charset="0"/>
                                     <a:ea typeface="Cambria Math" panose="02040503050406030204" pitchFamily="18" charset="0"/>
                                   </a:rPr>
@@ -11544,7 +11585,7 @@
                           </m:sup>
                         </m:sSubSup>
                         <m:r>
-                          <a:rPr lang="en-US" sz="900" i="1">
+                          <a:rPr lang="en-US" sz="800" i="1">
                             <a:latin typeface="Cambria Math" panose="02040503050406030204" pitchFamily="18" charset="0"/>
                             <a:ea typeface="Cambria Math" panose="02040503050406030204" pitchFamily="18" charset="0"/>
                           </a:rPr>
@@ -11554,7 +11595,7 @@
                           <m:rPr>
                             <m:nor/>
                           </m:rPr>
-                          <a:rPr lang="en-US" sz="900" dirty="0">
+                          <a:rPr lang="en-US" sz="800" dirty="0">
                             <a:ea typeface="Cambria Math" panose="02040503050406030204" pitchFamily="18" charset="0"/>
                           </a:rPr>
                           <m:t> </m:t>
@@ -11564,7 +11605,7 @@
                   </m:oMath>
                 </a14:m>
                 <a:r>
-                  <a:rPr lang="en-US" sz="900" dirty="0" smtClean="0">
+                  <a:rPr lang="en-US" sz="800" dirty="0" smtClean="0">
                     <a:ea typeface="Cambria Math" panose="02040503050406030204" pitchFamily="18" charset="0"/>
                   </a:rPr>
                   <a:t> </a:t>
@@ -11573,7 +11614,7 @@
               <a:p>
                 <a:pPr lvl="1"/>
                 <a:r>
-                  <a:rPr lang="en-US" sz="900" dirty="0" smtClean="0"/>
+                  <a:rPr lang="en-US" sz="800" dirty="0" smtClean="0"/>
                   <a:t>Can be separated into </a:t>
                 </a:r>
                 <a14:m>
@@ -11584,7 +11625,7 @@
                         <m:subHide m:val="on"/>
                         <m:supHide m:val="on"/>
                         <m:ctrlPr>
-                          <a:rPr lang="en-US" sz="900" i="1" smtClean="0">
+                          <a:rPr lang="en-US" sz="800" i="1" smtClean="0">
                             <a:latin typeface="Cambria Math" panose="02040503050406030204" pitchFamily="18" charset="0"/>
                           </a:rPr>
                         </m:ctrlPr>
@@ -11595,14 +11636,14 @@
                         <m:sSub>
                           <m:sSubPr>
                             <m:ctrlPr>
-                              <a:rPr lang="en-US" sz="900" i="1" smtClean="0">
+                              <a:rPr lang="en-US" sz="800" i="1" smtClean="0">
                                 <a:latin typeface="Cambria Math" panose="02040503050406030204" pitchFamily="18" charset="0"/>
                               </a:rPr>
                             </m:ctrlPr>
                           </m:sSubPr>
                           <m:e>
                             <m:r>
-                              <a:rPr lang="en-US" sz="900" b="0" i="1" smtClean="0">
+                              <a:rPr lang="en-US" sz="800" b="0" i="1" smtClean="0">
                                 <a:latin typeface="Cambria Math" panose="02040503050406030204" pitchFamily="18" charset="0"/>
                               </a:rPr>
                               <m:t>𝑉</m:t>
@@ -11610,7 +11651,7 @@
                           </m:e>
                           <m:sub>
                             <m:r>
-                              <a:rPr lang="en-US" sz="900" b="0" i="1" smtClean="0">
+                              <a:rPr lang="en-US" sz="800" b="0" i="1" smtClean="0">
                                 <a:latin typeface="Cambria Math" panose="02040503050406030204" pitchFamily="18" charset="0"/>
                               </a:rPr>
                               <m:t>𝑝</m:t>
@@ -11622,7 +11663,7 @@
                   </m:oMath>
                 </a14:m>
                 <a:r>
-                  <a:rPr lang="en-US" sz="900" dirty="0" smtClean="0"/>
+                  <a:rPr lang="en-US" sz="800" dirty="0" smtClean="0"/>
                   <a:t> with a vector </a:t>
                 </a:r>
                 <a14:m>
@@ -11630,14 +11671,14 @@
                     <m:sSub>
                       <m:sSubPr>
                         <m:ctrlPr>
-                          <a:rPr lang="en-US" sz="900" i="1">
+                          <a:rPr lang="en-US" sz="800" i="1">
                             <a:latin typeface="Cambria Math" panose="02040503050406030204" pitchFamily="18" charset="0"/>
                           </a:rPr>
                         </m:ctrlPr>
                       </m:sSubPr>
                       <m:e>
                         <m:r>
-                          <a:rPr lang="en-US" sz="900" i="1">
+                          <a:rPr lang="en-US" sz="800" i="1">
                             <a:latin typeface="Cambria Math" panose="02040503050406030204" pitchFamily="18" charset="0"/>
                           </a:rPr>
                           <m:t>𝑉</m:t>
@@ -11645,7 +11686,7 @@
                       </m:e>
                       <m:sub>
                         <m:r>
-                          <a:rPr lang="en-US" sz="900" i="1">
+                          <a:rPr lang="en-US" sz="800" i="1">
                             <a:latin typeface="Cambria Math" panose="02040503050406030204" pitchFamily="18" charset="0"/>
                           </a:rPr>
                           <m:t>𝑝</m:t>
@@ -11655,20 +11696,20 @@
                   </m:oMath>
                 </a14:m>
                 <a:r>
-                  <a:rPr lang="en-US" sz="900" dirty="0" smtClean="0"/>
+                  <a:rPr lang="en-US" sz="800" dirty="0" smtClean="0"/>
                   <a:t> for each party </a:t>
                 </a:r>
                 <a:br>
-                  <a:rPr lang="en-US" sz="900" dirty="0" smtClean="0"/>
+                  <a:rPr lang="en-US" sz="800" dirty="0" smtClean="0"/>
                 </a:br>
                 <a:r>
-                  <a:rPr lang="en-US" sz="900" dirty="0" smtClean="0"/>
+                  <a:rPr lang="en-US" sz="800" dirty="0" smtClean="0"/>
                   <a:t>where</a:t>
                 </a:r>
                 <a14:m>
                   <m:oMath xmlns:m="http://schemas.openxmlformats.org/officeDocument/2006/math">
                     <m:r>
-                      <a:rPr lang="en-US" sz="900" b="0" i="0" smtClean="0">
+                      <a:rPr lang="en-US" sz="800" b="0" i="0" smtClean="0">
                         <a:latin typeface="Cambria Math" panose="02040503050406030204" pitchFamily="18" charset="0"/>
                         <a:ea typeface="Cambria Math" panose="02040503050406030204" pitchFamily="18" charset="0"/>
                       </a:rPr>
@@ -11677,7 +11718,7 @@
                     <m:sSub>
                       <m:sSubPr>
                         <m:ctrlPr>
-                          <a:rPr lang="en-US" sz="900" i="1">
+                          <a:rPr lang="en-US" sz="800" i="1">
                             <a:latin typeface="Cambria Math" panose="02040503050406030204" pitchFamily="18" charset="0"/>
                             <a:ea typeface="Cambria Math" panose="02040503050406030204" pitchFamily="18" charset="0"/>
                           </a:rPr>
@@ -11685,7 +11726,7 @@
                       </m:sSubPr>
                       <m:e>
                         <m:r>
-                          <a:rPr lang="en-US" sz="900" b="0" i="1" smtClean="0">
+                          <a:rPr lang="en-US" sz="800" b="0" i="1" smtClean="0">
                             <a:latin typeface="Cambria Math" panose="02040503050406030204" pitchFamily="18" charset="0"/>
                             <a:ea typeface="Cambria Math" panose="02040503050406030204" pitchFamily="18" charset="0"/>
                           </a:rPr>
@@ -11694,7 +11735,7 @@
                       </m:e>
                       <m:sub>
                         <m:r>
-                          <a:rPr lang="en-US" sz="900" i="1">
+                          <a:rPr lang="en-US" sz="800" i="1">
                             <a:latin typeface="Cambria Math" panose="02040503050406030204" pitchFamily="18" charset="0"/>
                             <a:ea typeface="Cambria Math" panose="02040503050406030204" pitchFamily="18" charset="0"/>
                           </a:rPr>
@@ -11703,7 +11744,7 @@
                       </m:sub>
                     </m:sSub>
                     <m:r>
-                      <a:rPr lang="en-US" sz="900" i="1">
+                      <a:rPr lang="en-US" sz="800" i="1">
                         <a:latin typeface="Cambria Math" panose="02040503050406030204" pitchFamily="18" charset="0"/>
                       </a:rPr>
                       <m:t>= </m:t>
@@ -11711,14 +11752,14 @@
                     <m:sSubSup>
                       <m:sSubSupPr>
                         <m:ctrlPr>
-                          <a:rPr lang="en-US" sz="900" i="1">
+                          <a:rPr lang="en-US" sz="800" i="1">
                             <a:latin typeface="Cambria Math" panose="02040503050406030204" pitchFamily="18" charset="0"/>
                           </a:rPr>
                         </m:ctrlPr>
                       </m:sSubSupPr>
                       <m:e>
                         <m:r>
-                          <a:rPr lang="en-US" sz="900" i="1">
+                          <a:rPr lang="en-US" sz="800" i="1">
                             <a:latin typeface="Cambria Math" panose="02040503050406030204" pitchFamily="18" charset="0"/>
                           </a:rPr>
                           <m:t>{</m:t>
@@ -11729,7 +11770,7 @@
                           <m:naryPr>
                             <m:chr m:val="∑"/>
                             <m:ctrlPr>
-                              <a:rPr lang="en-US" sz="900" i="1">
+                              <a:rPr lang="en-US" sz="800" i="1">
                                 <a:latin typeface="Cambria Math" panose="02040503050406030204" pitchFamily="18" charset="0"/>
                                 <a:ea typeface="Cambria Math" panose="02040503050406030204" pitchFamily="18" charset="0"/>
                               </a:rPr>
@@ -11740,14 +11781,14 @@
                               <m:rPr>
                                 <m:brk m:alnAt="23"/>
                               </m:rPr>
-                              <a:rPr lang="en-US" sz="900" i="1">
+                              <a:rPr lang="en-US" sz="800" i="1">
                                 <a:latin typeface="Cambria Math" panose="02040503050406030204" pitchFamily="18" charset="0"/>
                                 <a:ea typeface="Cambria Math" panose="02040503050406030204" pitchFamily="18" charset="0"/>
                               </a:rPr>
                               <m:t>𝑛</m:t>
                             </m:r>
                             <m:r>
-                              <a:rPr lang="en-US" sz="900" i="1">
+                              <a:rPr lang="en-US" sz="800" i="1">
                                 <a:latin typeface="Cambria Math" panose="02040503050406030204" pitchFamily="18" charset="0"/>
                                 <a:ea typeface="Cambria Math" panose="02040503050406030204" pitchFamily="18" charset="0"/>
                               </a:rPr>
@@ -11756,7 +11797,7 @@
                           </m:sub>
                           <m:sup>
                             <m:r>
-                              <a:rPr lang="en-US" sz="900" i="1">
+                              <a:rPr lang="en-US" sz="800" i="1">
                                 <a:latin typeface="Cambria Math" panose="02040503050406030204" pitchFamily="18" charset="0"/>
                                 <a:ea typeface="Cambria Math" panose="02040503050406030204" pitchFamily="18" charset="0"/>
                               </a:rPr>
@@ -11767,7 +11808,7 @@
                             <m:d>
                               <m:dPr>
                                 <m:ctrlPr>
-                                  <a:rPr lang="en-US" sz="900" i="1">
+                                  <a:rPr lang="en-US" sz="800" i="1">
                                     <a:latin typeface="Cambria Math" panose="02040503050406030204" pitchFamily="18" charset="0"/>
                                     <a:ea typeface="Cambria Math" panose="02040503050406030204" pitchFamily="18" charset="0"/>
                                   </a:rPr>
@@ -11775,7 +11816,7 @@
                               </m:dPr>
                               <m:e>
                                 <m:r>
-                                  <a:rPr lang="en-US" sz="900" i="1">
+                                  <a:rPr lang="en-US" sz="800" i="1">
                                     <a:latin typeface="Cambria Math" panose="02040503050406030204" pitchFamily="18" charset="0"/>
                                     <a:ea typeface="Cambria Math" panose="02040503050406030204" pitchFamily="18" charset="0"/>
                                   </a:rPr>
@@ -11784,7 +11825,7 @@
                                 <m:sSubSup>
                                   <m:sSubSupPr>
                                     <m:ctrlPr>
-                                      <a:rPr lang="en-US" sz="900" i="1">
+                                      <a:rPr lang="en-US" sz="800" i="1">
                                         <a:latin typeface="Cambria Math" panose="02040503050406030204" pitchFamily="18" charset="0"/>
                                         <a:ea typeface="Cambria Math" panose="02040503050406030204" pitchFamily="18" charset="0"/>
                                       </a:rPr>
@@ -11792,7 +11833,7 @@
                                   </m:sSubSupPr>
                                   <m:e>
                                     <m:r>
-                                      <a:rPr lang="en-US" sz="900" i="1">
+                                      <a:rPr lang="en-US" sz="800" i="1">
                                         <a:latin typeface="Cambria Math" panose="02040503050406030204" pitchFamily="18" charset="0"/>
                                         <a:ea typeface="Cambria Math" panose="02040503050406030204" pitchFamily="18" charset="0"/>
                                       </a:rPr>
@@ -11801,7 +11842,7 @@
                                   </m:e>
                                   <m:sub>
                                     <m:r>
-                                      <a:rPr lang="en-US" sz="900" i="1">
+                                      <a:rPr lang="en-US" sz="800" i="1">
                                         <a:latin typeface="Cambria Math" panose="02040503050406030204" pitchFamily="18" charset="0"/>
                                         <a:ea typeface="Cambria Math" panose="02040503050406030204" pitchFamily="18" charset="0"/>
                                       </a:rPr>
@@ -11810,14 +11851,14 @@
                                   </m:sub>
                                   <m:sup>
                                     <m:r>
-                                      <a:rPr lang="en-US" sz="900" i="1">
+                                      <a:rPr lang="en-US" sz="800" i="1">
                                         <a:latin typeface="Cambria Math" panose="02040503050406030204" pitchFamily="18" charset="0"/>
                                         <a:ea typeface="Cambria Math" panose="02040503050406030204" pitchFamily="18" charset="0"/>
                                       </a:rPr>
                                       <m:t>𝑝</m:t>
                                     </m:r>
                                     <m:r>
-                                      <a:rPr lang="en-US" sz="900" i="1">
+                                      <a:rPr lang="en-US" sz="800" i="1">
                                         <a:latin typeface="Cambria Math" panose="02040503050406030204" pitchFamily="18" charset="0"/>
                                         <a:ea typeface="Cambria Math" panose="02040503050406030204" pitchFamily="18" charset="0"/>
                                       </a:rPr>
@@ -11826,7 +11867,7 @@
                                   </m:sup>
                                 </m:sSubSup>
                                 <m:r>
-                                  <a:rPr lang="en-US" sz="900" i="1">
+                                  <a:rPr lang="en-US" sz="800" i="1">
                                     <a:latin typeface="Cambria Math" panose="02040503050406030204" pitchFamily="18" charset="0"/>
                                     <a:ea typeface="Cambria Math" panose="02040503050406030204" pitchFamily="18" charset="0"/>
                                   </a:rPr>
@@ -11835,7 +11876,7 @@
                                 <m:sSubSup>
                                   <m:sSubSupPr>
                                     <m:ctrlPr>
-                                      <a:rPr lang="en-US" sz="900" i="1">
+                                      <a:rPr lang="en-US" sz="800" i="1">
                                         <a:latin typeface="Cambria Math" panose="02040503050406030204" pitchFamily="18" charset="0"/>
                                         <a:ea typeface="Cambria Math" panose="02040503050406030204" pitchFamily="18" charset="0"/>
                                       </a:rPr>
@@ -11843,7 +11884,7 @@
                                   </m:sSubSupPr>
                                   <m:e>
                                     <m:r>
-                                      <a:rPr lang="en-US" sz="900" i="1">
+                                      <a:rPr lang="en-US" sz="800" i="1">
                                         <a:latin typeface="Cambria Math" panose="02040503050406030204" pitchFamily="18" charset="0"/>
                                         <a:ea typeface="Cambria Math" panose="02040503050406030204" pitchFamily="18" charset="0"/>
                                       </a:rPr>
@@ -11852,7 +11893,7 @@
                                   </m:e>
                                   <m:sub>
                                     <m:r>
-                                      <a:rPr lang="en-US" sz="900" i="1">
+                                      <a:rPr lang="en-US" sz="800" i="1">
                                         <a:latin typeface="Cambria Math" panose="02040503050406030204" pitchFamily="18" charset="0"/>
                                         <a:ea typeface="Cambria Math" panose="02040503050406030204" pitchFamily="18" charset="0"/>
                                       </a:rPr>
@@ -11861,14 +11902,14 @@
                                   </m:sub>
                                   <m:sup>
                                     <m:r>
-                                      <a:rPr lang="en-US" sz="900" i="1">
+                                      <a:rPr lang="en-US" sz="800" i="1">
                                         <a:latin typeface="Cambria Math" panose="02040503050406030204" pitchFamily="18" charset="0"/>
                                         <a:ea typeface="Cambria Math" panose="02040503050406030204" pitchFamily="18" charset="0"/>
                                       </a:rPr>
                                       <m:t>𝑝</m:t>
                                     </m:r>
                                     <m:r>
-                                      <a:rPr lang="en-US" sz="900" i="1">
+                                      <a:rPr lang="en-US" sz="800" i="1">
                                         <a:latin typeface="Cambria Math" panose="02040503050406030204" pitchFamily="18" charset="0"/>
                                         <a:ea typeface="Cambria Math" panose="02040503050406030204" pitchFamily="18" charset="0"/>
                                       </a:rPr>
@@ -11883,7 +11924,7 @@
                         <m:sSub>
                           <m:sSubPr>
                             <m:ctrlPr>
-                              <a:rPr lang="en-US" sz="900" i="1">
+                              <a:rPr lang="en-US" sz="800" i="1">
                                 <a:latin typeface="Cambria Math" panose="02040503050406030204" pitchFamily="18" charset="0"/>
                                 <a:ea typeface="Cambria Math" panose="02040503050406030204" pitchFamily="18" charset="0"/>
                               </a:rPr>
@@ -11891,7 +11932,7 @@
                           </m:sSubPr>
                           <m:e>
                             <m:r>
-                              <a:rPr lang="en-US" sz="900" i="1">
+                              <a:rPr lang="en-US" sz="800" i="1">
                                 <a:latin typeface="Cambria Math" panose="02040503050406030204" pitchFamily="18" charset="0"/>
                                 <a:ea typeface="Cambria Math" panose="02040503050406030204" pitchFamily="18" charset="0"/>
                               </a:rPr>
@@ -11900,7 +11941,7 @@
                           </m:e>
                           <m:sub>
                             <m:r>
-                              <a:rPr lang="en-US" sz="900" i="1">
+                              <a:rPr lang="en-US" sz="800" i="1">
                                 <a:latin typeface="Cambria Math" panose="02040503050406030204" pitchFamily="18" charset="0"/>
                                 <a:ea typeface="Cambria Math" panose="02040503050406030204" pitchFamily="18" charset="0"/>
                               </a:rPr>
@@ -11909,7 +11950,7 @@
                           </m:sub>
                         </m:sSub>
                         <m:r>
-                          <a:rPr lang="en-US" sz="900" i="1">
+                          <a:rPr lang="en-US" sz="800" i="1">
                             <a:latin typeface="Cambria Math" panose="02040503050406030204" pitchFamily="18" charset="0"/>
                             <a:ea typeface="Cambria Math" panose="02040503050406030204" pitchFamily="18" charset="0"/>
                           </a:rPr>
@@ -11918,7 +11959,7 @@
                         <m:sSub>
                           <m:sSubPr>
                             <m:ctrlPr>
-                              <a:rPr lang="en-US" sz="900" i="1">
+                              <a:rPr lang="en-US" sz="800" i="1">
                                 <a:latin typeface="Cambria Math" panose="02040503050406030204" pitchFamily="18" charset="0"/>
                                 <a:ea typeface="Cambria Math" panose="02040503050406030204" pitchFamily="18" charset="0"/>
                               </a:rPr>
@@ -11926,7 +11967,7 @@
                           </m:sSubPr>
                           <m:e>
                             <m:r>
-                              <a:rPr lang="en-US" sz="900" i="1">
+                              <a:rPr lang="en-US" sz="800" i="1">
                                 <a:latin typeface="Cambria Math" panose="02040503050406030204" pitchFamily="18" charset="0"/>
                                 <a:ea typeface="Cambria Math" panose="02040503050406030204" pitchFamily="18" charset="0"/>
                               </a:rPr>
@@ -11935,7 +11976,7 @@
                           </m:e>
                           <m:sub>
                             <m:r>
-                              <a:rPr lang="en-US" sz="900" i="1">
+                              <a:rPr lang="en-US" sz="800" i="1">
                                 <a:latin typeface="Cambria Math" panose="02040503050406030204" pitchFamily="18" charset="0"/>
                                 <a:ea typeface="Cambria Math" panose="02040503050406030204" pitchFamily="18" charset="0"/>
                               </a:rPr>
@@ -11946,7 +11987,7 @@
                         <m:d>
                           <m:dPr>
                             <m:ctrlPr>
-                              <a:rPr lang="en-US" sz="900" i="1">
+                              <a:rPr lang="en-US" sz="800" i="1">
                                 <a:latin typeface="Cambria Math" panose="02040503050406030204" pitchFamily="18" charset="0"/>
                                 <a:ea typeface="Cambria Math" panose="02040503050406030204" pitchFamily="18" charset="0"/>
                               </a:rPr>
@@ -11956,14 +11997,14 @@
                             <m:sSubSup>
                               <m:sSubSupPr>
                                 <m:ctrlPr>
-                                  <a:rPr lang="en-US" sz="900" i="1">
+                                  <a:rPr lang="en-US" sz="800" i="1">
                                     <a:latin typeface="Cambria Math" panose="02040503050406030204" pitchFamily="18" charset="0"/>
                                   </a:rPr>
                                 </m:ctrlPr>
                               </m:sSubSupPr>
                               <m:e>
                                 <m:r>
-                                  <a:rPr lang="en-US" sz="900" i="1">
+                                  <a:rPr lang="en-US" sz="800" i="1">
                                     <a:latin typeface="Cambria Math" panose="02040503050406030204" pitchFamily="18" charset="0"/>
                                   </a:rPr>
                                   <m:t>𝑉</m:t>
@@ -11971,7 +12012,7 @@
                               </m:e>
                               <m:sub>
                                 <m:r>
-                                  <a:rPr lang="en-US" sz="900" i="1">
+                                  <a:rPr lang="en-US" sz="800" i="1">
                                     <a:latin typeface="Cambria Math" panose="02040503050406030204" pitchFamily="18" charset="0"/>
                                   </a:rPr>
                                   <m:t>𝑝</m:t>
@@ -11979,13 +12020,13 @@
                               </m:sub>
                               <m:sup>
                                 <m:r>
-                                  <a:rPr lang="en-US" sz="900" i="1">
+                                  <a:rPr lang="en-US" sz="800" i="1">
                                     <a:latin typeface="Cambria Math" panose="02040503050406030204" pitchFamily="18" charset="0"/>
                                   </a:rPr>
                                   <m:t>𝑡</m:t>
                                 </m:r>
                                 <m:r>
-                                  <a:rPr lang="en-US" sz="900" i="1">
+                                  <a:rPr lang="en-US" sz="800" i="1">
                                     <a:latin typeface="Cambria Math" panose="02040503050406030204" pitchFamily="18" charset="0"/>
                                     <a:ea typeface="Cambria Math" panose="02040503050406030204" pitchFamily="18" charset="0"/>
                                   </a:rPr>
@@ -11996,7 +12037,7 @@
                                     <m:begChr m:val="["/>
                                     <m:endChr m:val="]"/>
                                     <m:ctrlPr>
-                                      <a:rPr lang="en-US" sz="900" i="1">
+                                      <a:rPr lang="en-US" sz="800" i="1">
                                         <a:latin typeface="Cambria Math" panose="02040503050406030204" pitchFamily="18" charset="0"/>
                                         <a:ea typeface="Cambria Math" panose="02040503050406030204" pitchFamily="18" charset="0"/>
                                       </a:rPr>
@@ -12004,14 +12045,14 @@
                                   </m:dPr>
                                   <m:e>
                                     <m:r>
-                                      <a:rPr lang="en-US" sz="900" i="1">
+                                      <a:rPr lang="en-US" sz="800" i="1">
                                         <a:latin typeface="Cambria Math" panose="02040503050406030204" pitchFamily="18" charset="0"/>
                                         <a:ea typeface="Cambria Math" panose="02040503050406030204" pitchFamily="18" charset="0"/>
                                       </a:rPr>
                                       <m:t>1,</m:t>
                                     </m:r>
                                     <m:r>
-                                      <a:rPr lang="en-US" sz="900" i="1">
+                                      <a:rPr lang="en-US" sz="800" i="1">
                                         <a:latin typeface="Cambria Math" panose="02040503050406030204" pitchFamily="18" charset="0"/>
                                         <a:ea typeface="Cambria Math" panose="02040503050406030204" pitchFamily="18" charset="0"/>
                                       </a:rPr>
@@ -12027,13 +12068,13 @@
                           <m:rPr>
                             <m:nor/>
                           </m:rPr>
-                          <a:rPr lang="en-US" sz="900" dirty="0">
+                          <a:rPr lang="en-US" sz="800" dirty="0">
                             <a:ea typeface="Cambria Math" panose="02040503050406030204" pitchFamily="18" charset="0"/>
                           </a:rPr>
                           <m:t>  </m:t>
                         </m:r>
                         <m:r>
-                          <a:rPr lang="en-US" sz="900" i="1">
+                          <a:rPr lang="en-US" sz="800" i="1">
                             <a:latin typeface="Cambria Math" panose="02040503050406030204" pitchFamily="18" charset="0"/>
                           </a:rPr>
                           <m:t>𝑖𝑓</m:t>
@@ -12041,7 +12082,7 @@
                         <m:sSub>
                           <m:sSubPr>
                             <m:ctrlPr>
-                              <a:rPr lang="en-US" sz="900" i="1">
+                              <a:rPr lang="en-US" sz="800" i="1">
                                 <a:latin typeface="Cambria Math" panose="02040503050406030204" pitchFamily="18" charset="0"/>
                                 <a:ea typeface="Cambria Math" panose="02040503050406030204" pitchFamily="18" charset="0"/>
                               </a:rPr>
@@ -12049,14 +12090,14 @@
                           </m:sSubPr>
                           <m:e>
                             <m:r>
-                              <a:rPr lang="en-US" sz="900" b="0" i="1" smtClean="0">
+                              <a:rPr lang="en-US" sz="800" b="0" i="1" smtClean="0">
                                 <a:latin typeface="Cambria Math" panose="02040503050406030204" pitchFamily="18" charset="0"/>
                                 <a:ea typeface="Cambria Math" panose="02040503050406030204" pitchFamily="18" charset="0"/>
                               </a:rPr>
                               <m:t> </m:t>
                             </m:r>
                             <m:r>
-                              <a:rPr lang="en-US" sz="900" i="1">
+                              <a:rPr lang="en-US" sz="800" i="1">
                                 <a:latin typeface="Cambria Math" panose="02040503050406030204" pitchFamily="18" charset="0"/>
                                 <a:ea typeface="Cambria Math" panose="02040503050406030204" pitchFamily="18" charset="0"/>
                               </a:rPr>
@@ -12065,7 +12106,7 @@
                           </m:e>
                           <m:sub>
                             <m:r>
-                              <a:rPr lang="en-US" sz="900" i="1">
+                              <a:rPr lang="en-US" sz="800" i="1">
                                 <a:latin typeface="Cambria Math" panose="02040503050406030204" pitchFamily="18" charset="0"/>
                                 <a:ea typeface="Cambria Math" panose="02040503050406030204" pitchFamily="18" charset="0"/>
                               </a:rPr>
@@ -12074,35 +12115,35 @@
                           </m:sub>
                         </m:sSub>
                         <m:r>
-                          <a:rPr lang="en-US" sz="900" b="0" i="1" smtClean="0">
+                          <a:rPr lang="en-US" sz="800" b="0" i="1" smtClean="0">
                             <a:latin typeface="Cambria Math" panose="02040503050406030204" pitchFamily="18" charset="0"/>
                             <a:ea typeface="Cambria Math" panose="02040503050406030204" pitchFamily="18" charset="0"/>
                           </a:rPr>
                           <m:t>𝑖𝑠</m:t>
                         </m:r>
                         <m:r>
-                          <a:rPr lang="en-US" sz="900" b="0" i="1" smtClean="0">
+                          <a:rPr lang="en-US" sz="800" b="0" i="1" smtClean="0">
                             <a:latin typeface="Cambria Math" panose="02040503050406030204" pitchFamily="18" charset="0"/>
                             <a:ea typeface="Cambria Math" panose="02040503050406030204" pitchFamily="18" charset="0"/>
                           </a:rPr>
                           <m:t> </m:t>
                         </m:r>
                         <m:r>
-                          <a:rPr lang="en-US" sz="900" b="0" i="1" smtClean="0">
+                          <a:rPr lang="en-US" sz="800" b="0" i="1" smtClean="0">
                             <a:latin typeface="Cambria Math" panose="02040503050406030204" pitchFamily="18" charset="0"/>
                             <a:ea typeface="Cambria Math" panose="02040503050406030204" pitchFamily="18" charset="0"/>
                           </a:rPr>
                           <m:t>𝑙𝑜𝑐𝑎𝑙𝑙𝑦</m:t>
                         </m:r>
                         <m:r>
-                          <a:rPr lang="en-US" sz="900" b="0" i="1" smtClean="0">
+                          <a:rPr lang="en-US" sz="800" b="0" i="1" smtClean="0">
                             <a:latin typeface="Cambria Math" panose="02040503050406030204" pitchFamily="18" charset="0"/>
                             <a:ea typeface="Cambria Math" panose="02040503050406030204" pitchFamily="18" charset="0"/>
                           </a:rPr>
                           <m:t> </m:t>
                         </m:r>
                         <m:r>
-                          <a:rPr lang="en-US" sz="900" b="0" i="1" smtClean="0">
+                          <a:rPr lang="en-US" sz="800" b="0" i="1" smtClean="0">
                             <a:latin typeface="Cambria Math" panose="02040503050406030204" pitchFamily="18" charset="0"/>
                             <a:ea typeface="Cambria Math" panose="02040503050406030204" pitchFamily="18" charset="0"/>
                           </a:rPr>
@@ -12111,13 +12152,13 @@
                       </m:sub>
                       <m:sup>
                         <m:r>
-                          <a:rPr lang="en-US" sz="900" b="0" i="1" smtClean="0">
+                          <a:rPr lang="en-US" sz="800" b="0" i="1" smtClean="0">
                             <a:latin typeface="Cambria Math" panose="02040503050406030204" pitchFamily="18" charset="0"/>
                           </a:rPr>
                           <m:t>1 </m:t>
                         </m:r>
                         <m:r>
-                          <a:rPr lang="en-US" sz="900" i="1">
+                          <a:rPr lang="en-US" sz="800" i="1">
                             <a:latin typeface="Cambria Math" panose="02040503050406030204" pitchFamily="18" charset="0"/>
                           </a:rPr>
                           <m:t>𝑖𝑓</m:t>
@@ -12125,7 +12166,7 @@
                         <m:sSub>
                           <m:sSubPr>
                             <m:ctrlPr>
-                              <a:rPr lang="en-US" sz="900" i="1">
+                              <a:rPr lang="en-US" sz="800" i="1">
                                 <a:latin typeface="Cambria Math" panose="02040503050406030204" pitchFamily="18" charset="0"/>
                                 <a:ea typeface="Cambria Math" panose="02040503050406030204" pitchFamily="18" charset="0"/>
                               </a:rPr>
@@ -12133,14 +12174,14 @@
                           </m:sSubPr>
                           <m:e>
                             <m:r>
-                              <a:rPr lang="en-US" sz="900" i="1">
+                              <a:rPr lang="en-US" sz="800" i="1">
                                 <a:latin typeface="Cambria Math" panose="02040503050406030204" pitchFamily="18" charset="0"/>
                                 <a:ea typeface="Cambria Math" panose="02040503050406030204" pitchFamily="18" charset="0"/>
                               </a:rPr>
                               <m:t> </m:t>
                             </m:r>
                             <m:r>
-                              <a:rPr lang="en-US" sz="900" i="1">
+                              <a:rPr lang="en-US" sz="800" i="1">
                                 <a:latin typeface="Cambria Math" panose="02040503050406030204" pitchFamily="18" charset="0"/>
                                 <a:ea typeface="Cambria Math" panose="02040503050406030204" pitchFamily="18" charset="0"/>
                               </a:rPr>
@@ -12149,7 +12190,7 @@
                           </m:e>
                           <m:sub>
                             <m:r>
-                              <a:rPr lang="en-US" sz="900" i="1">
+                              <a:rPr lang="en-US" sz="800" i="1">
                                 <a:latin typeface="Cambria Math" panose="02040503050406030204" pitchFamily="18" charset="0"/>
                                 <a:ea typeface="Cambria Math" panose="02040503050406030204" pitchFamily="18" charset="0"/>
                               </a:rPr>
@@ -12158,49 +12199,49 @@
                           </m:sub>
                         </m:sSub>
                         <m:r>
-                          <a:rPr lang="en-US" sz="900" i="1">
+                          <a:rPr lang="en-US" sz="800" i="1">
                             <a:latin typeface="Cambria Math" panose="02040503050406030204" pitchFamily="18" charset="0"/>
                             <a:ea typeface="Cambria Math" panose="02040503050406030204" pitchFamily="18" charset="0"/>
                           </a:rPr>
                           <m:t>𝑖𝑠</m:t>
                         </m:r>
                         <m:r>
-                          <a:rPr lang="en-US" sz="900" i="1">
+                          <a:rPr lang="en-US" sz="800" i="1">
                             <a:latin typeface="Cambria Math" panose="02040503050406030204" pitchFamily="18" charset="0"/>
                             <a:ea typeface="Cambria Math" panose="02040503050406030204" pitchFamily="18" charset="0"/>
                           </a:rPr>
                           <m:t> </m:t>
                         </m:r>
                         <m:r>
-                          <a:rPr lang="en-US" sz="900" b="0" i="1" smtClean="0">
+                          <a:rPr lang="en-US" sz="800" b="0" i="1" smtClean="0">
                             <a:latin typeface="Cambria Math" panose="02040503050406030204" pitchFamily="18" charset="0"/>
                             <a:ea typeface="Cambria Math" panose="02040503050406030204" pitchFamily="18" charset="0"/>
                           </a:rPr>
                           <m:t>𝑛𝑜𝑡</m:t>
                         </m:r>
                         <m:r>
-                          <a:rPr lang="en-US" sz="900" b="0" i="1" smtClean="0">
+                          <a:rPr lang="en-US" sz="800" b="0" i="1" smtClean="0">
                             <a:latin typeface="Cambria Math" panose="02040503050406030204" pitchFamily="18" charset="0"/>
                             <a:ea typeface="Cambria Math" panose="02040503050406030204" pitchFamily="18" charset="0"/>
                           </a:rPr>
                           <m:t> </m:t>
                         </m:r>
                         <m:r>
-                          <a:rPr lang="en-US" sz="900" i="1">
+                          <a:rPr lang="en-US" sz="800" i="1">
                             <a:latin typeface="Cambria Math" panose="02040503050406030204" pitchFamily="18" charset="0"/>
                             <a:ea typeface="Cambria Math" panose="02040503050406030204" pitchFamily="18" charset="0"/>
                           </a:rPr>
                           <m:t>𝑙𝑜𝑐𝑎𝑙𝑙𝑦</m:t>
                         </m:r>
                         <m:r>
-                          <a:rPr lang="en-US" sz="900" i="1">
+                          <a:rPr lang="en-US" sz="800" i="1">
                             <a:latin typeface="Cambria Math" panose="02040503050406030204" pitchFamily="18" charset="0"/>
                             <a:ea typeface="Cambria Math" panose="02040503050406030204" pitchFamily="18" charset="0"/>
                           </a:rPr>
                           <m:t> </m:t>
                         </m:r>
                         <m:r>
-                          <a:rPr lang="en-US" sz="900" i="1">
+                          <a:rPr lang="en-US" sz="800" i="1">
                             <a:latin typeface="Cambria Math" panose="02040503050406030204" pitchFamily="18" charset="0"/>
                             <a:ea typeface="Cambria Math" panose="02040503050406030204" pitchFamily="18" charset="0"/>
                           </a:rPr>
@@ -12210,20 +12251,28 @@
                     </m:sSubSup>
                   </m:oMath>
                 </a14:m>
-                <a:endParaRPr lang="nl-NL" sz="900" dirty="0" smtClean="0"/>
+                <a:endParaRPr lang="nl-NL" sz="800" dirty="0" smtClean="0"/>
               </a:p>
               <a:p>
                 <a:pPr lvl="1"/>
                 <a:r>
-                  <a:rPr lang="en-US" sz="900" dirty="0" smtClean="0"/>
-                  <a:t>B can be revealed to the auxiliary party provided it does not know </a:t>
+                  <a:rPr lang="en-US" sz="800" dirty="0" smtClean="0"/>
+                  <a:t>B can be revealed to the </a:t>
+                </a:r>
+                <a:r>
+                  <a:rPr lang="en-US" sz="800" dirty="0" smtClean="0"/>
+                  <a:t>virtual data-owner </a:t>
+                </a:r>
+                <a:r>
+                  <a:rPr lang="en-US" sz="800" dirty="0" smtClean="0"/>
+                  <a:t>provided it does not know </a:t>
                 </a:r>
                 <a14:m>
                   <m:oMath xmlns:m="http://schemas.openxmlformats.org/officeDocument/2006/math">
                     <m:sSub>
                       <m:sSubPr>
                         <m:ctrlPr>
-                          <a:rPr lang="en-US" sz="900" i="1">
+                          <a:rPr lang="en-US" sz="800" i="1">
                             <a:latin typeface="Cambria Math" panose="02040503050406030204" pitchFamily="18" charset="0"/>
                             <a:ea typeface="Cambria Math" panose="02040503050406030204" pitchFamily="18" charset="0"/>
                           </a:rPr>
@@ -12231,7 +12280,7 @@
                       </m:sSubPr>
                       <m:e>
                         <m:r>
-                          <a:rPr lang="en-US" sz="900" i="1">
+                          <a:rPr lang="en-US" sz="800" i="1">
                             <a:latin typeface="Cambria Math" panose="02040503050406030204" pitchFamily="18" charset="0"/>
                             <a:ea typeface="Cambria Math" panose="02040503050406030204" pitchFamily="18" charset="0"/>
                           </a:rPr>
@@ -12240,7 +12289,7 @@
                       </m:e>
                       <m:sub>
                         <m:r>
-                          <a:rPr lang="en-US" sz="900" i="1">
+                          <a:rPr lang="en-US" sz="800" i="1">
                             <a:latin typeface="Cambria Math" panose="02040503050406030204" pitchFamily="18" charset="0"/>
                             <a:ea typeface="Cambria Math" panose="02040503050406030204" pitchFamily="18" charset="0"/>
                           </a:rPr>
@@ -12249,7 +12298,7 @@
                       </m:sub>
                     </m:sSub>
                     <m:r>
-                      <a:rPr lang="en-US" sz="900" i="1">
+                      <a:rPr lang="en-US" sz="800" i="1">
                         <a:latin typeface="Cambria Math" panose="02040503050406030204" pitchFamily="18" charset="0"/>
                         <a:ea typeface="Cambria Math" panose="02040503050406030204" pitchFamily="18" charset="0"/>
                       </a:rPr>
@@ -12258,14 +12307,14 @@
                     <m:sSubSup>
                       <m:sSubSupPr>
                         <m:ctrlPr>
-                          <a:rPr lang="en-US" sz="900" i="1">
+                          <a:rPr lang="en-US" sz="800" i="1">
                             <a:latin typeface="Cambria Math" panose="02040503050406030204" pitchFamily="18" charset="0"/>
                           </a:rPr>
                         </m:ctrlPr>
                       </m:sSubSupPr>
                       <m:e>
                         <m:r>
-                          <a:rPr lang="en-US" sz="900" i="1">
+                          <a:rPr lang="en-US" sz="800" i="1">
                             <a:latin typeface="Cambria Math" panose="02040503050406030204" pitchFamily="18" charset="0"/>
                           </a:rPr>
                           <m:t>𝑉</m:t>
@@ -12273,7 +12322,7 @@
                       </m:e>
                       <m:sub>
                         <m:r>
-                          <a:rPr lang="en-US" sz="900" i="1">
+                          <a:rPr lang="en-US" sz="800" i="1">
                             <a:latin typeface="Cambria Math" panose="02040503050406030204" pitchFamily="18" charset="0"/>
                           </a:rPr>
                           <m:t>𝑝</m:t>
@@ -12281,13 +12330,13 @@
                       </m:sub>
                       <m:sup>
                         <m:r>
-                          <a:rPr lang="en-US" sz="900" i="1">
+                          <a:rPr lang="en-US" sz="800" i="1">
                             <a:latin typeface="Cambria Math" panose="02040503050406030204" pitchFamily="18" charset="0"/>
                           </a:rPr>
                           <m:t>𝑡</m:t>
                         </m:r>
                         <m:r>
-                          <a:rPr lang="en-US" sz="900" i="1">
+                          <a:rPr lang="en-US" sz="800" i="1">
                             <a:latin typeface="Cambria Math" panose="02040503050406030204" pitchFamily="18" charset="0"/>
                             <a:ea typeface="Cambria Math" panose="02040503050406030204" pitchFamily="18" charset="0"/>
                           </a:rPr>
@@ -12298,7 +12347,7 @@
                             <m:begChr m:val="["/>
                             <m:endChr m:val="]"/>
                             <m:ctrlPr>
-                              <a:rPr lang="en-US" sz="900" i="1">
+                              <a:rPr lang="en-US" sz="800" i="1">
                                 <a:latin typeface="Cambria Math" panose="02040503050406030204" pitchFamily="18" charset="0"/>
                                 <a:ea typeface="Cambria Math" panose="02040503050406030204" pitchFamily="18" charset="0"/>
                               </a:rPr>
@@ -12306,14 +12355,14 @@
                           </m:dPr>
                           <m:e>
                             <m:r>
-                              <a:rPr lang="en-US" sz="900" i="1">
+                              <a:rPr lang="en-US" sz="800" i="1">
                                 <a:latin typeface="Cambria Math" panose="02040503050406030204" pitchFamily="18" charset="0"/>
                                 <a:ea typeface="Cambria Math" panose="02040503050406030204" pitchFamily="18" charset="0"/>
                               </a:rPr>
                               <m:t>1,</m:t>
                             </m:r>
                             <m:r>
-                              <a:rPr lang="en-US" sz="900" i="1">
+                              <a:rPr lang="en-US" sz="800" i="1">
                                 <a:latin typeface="Cambria Math" panose="02040503050406030204" pitchFamily="18" charset="0"/>
                                 <a:ea typeface="Cambria Math" panose="02040503050406030204" pitchFamily="18" charset="0"/>
                               </a:rPr>
@@ -12324,7 +12373,7 @@
                       </m:sup>
                     </m:sSubSup>
                     <m:r>
-                      <a:rPr lang="en-US" sz="900" i="1">
+                      <a:rPr lang="en-US" sz="800" i="1">
                         <a:latin typeface="Cambria Math" panose="02040503050406030204" pitchFamily="18" charset="0"/>
                         <a:ea typeface="Cambria Math" panose="02040503050406030204" pitchFamily="18" charset="0"/>
                       </a:rPr>
@@ -12334,7 +12383,7 @@
                       <m:rPr>
                         <m:nor/>
                       </m:rPr>
-                      <a:rPr lang="en-US" sz="900" dirty="0">
+                      <a:rPr lang="en-US" sz="800" dirty="0">
                         <a:ea typeface="Cambria Math" panose="02040503050406030204" pitchFamily="18" charset="0"/>
                       </a:rPr>
                       <m:t> </m:t>
@@ -12342,7 +12391,7 @@
                   </m:oMath>
                 </a14:m>
                 <a:r>
-                  <a:rPr lang="en-US" sz="900" dirty="0" smtClean="0"/>
+                  <a:rPr lang="en-US" sz="800" dirty="0" smtClean="0"/>
                   <a:t>and </a:t>
                 </a:r>
                 <a14:m>
@@ -12350,7 +12399,7 @@
                     <m:d>
                       <m:dPr>
                         <m:ctrlPr>
-                          <a:rPr lang="en-US" sz="900" i="1">
+                          <a:rPr lang="en-US" sz="800" i="1">
                             <a:latin typeface="Cambria Math" panose="02040503050406030204" pitchFamily="18" charset="0"/>
                             <a:ea typeface="Cambria Math" panose="02040503050406030204" pitchFamily="18" charset="0"/>
                           </a:rPr>
@@ -12358,7 +12407,7 @@
                       </m:dPr>
                       <m:e>
                         <m:r>
-                          <a:rPr lang="en-US" sz="900" i="1">
+                          <a:rPr lang="en-US" sz="800" i="1">
                             <a:latin typeface="Cambria Math" panose="02040503050406030204" pitchFamily="18" charset="0"/>
                             <a:ea typeface="Cambria Math" panose="02040503050406030204" pitchFamily="18" charset="0"/>
                           </a:rPr>
@@ -12367,7 +12416,7 @@
                         <m:sSubSup>
                           <m:sSubSupPr>
                             <m:ctrlPr>
-                              <a:rPr lang="en-US" sz="900" i="1">
+                              <a:rPr lang="en-US" sz="800" i="1">
                                 <a:latin typeface="Cambria Math" panose="02040503050406030204" pitchFamily="18" charset="0"/>
                                 <a:ea typeface="Cambria Math" panose="02040503050406030204" pitchFamily="18" charset="0"/>
                               </a:rPr>
@@ -12375,7 +12424,7 @@
                           </m:sSubSupPr>
                           <m:e>
                             <m:r>
-                              <a:rPr lang="en-US" sz="900" i="1">
+                              <a:rPr lang="en-US" sz="800" i="1">
                                 <a:latin typeface="Cambria Math" panose="02040503050406030204" pitchFamily="18" charset="0"/>
                                 <a:ea typeface="Cambria Math" panose="02040503050406030204" pitchFamily="18" charset="0"/>
                               </a:rPr>
@@ -12384,7 +12433,7 @@
                           </m:e>
                           <m:sub>
                             <m:r>
-                              <a:rPr lang="en-US" sz="900" i="1">
+                              <a:rPr lang="en-US" sz="800" i="1">
                                 <a:latin typeface="Cambria Math" panose="02040503050406030204" pitchFamily="18" charset="0"/>
                                 <a:ea typeface="Cambria Math" panose="02040503050406030204" pitchFamily="18" charset="0"/>
                               </a:rPr>
@@ -12393,14 +12442,14 @@
                           </m:sub>
                           <m:sup>
                             <m:r>
-                              <a:rPr lang="en-US" sz="900" i="1">
+                              <a:rPr lang="en-US" sz="800" i="1">
                                 <a:latin typeface="Cambria Math" panose="02040503050406030204" pitchFamily="18" charset="0"/>
                                 <a:ea typeface="Cambria Math" panose="02040503050406030204" pitchFamily="18" charset="0"/>
                               </a:rPr>
                               <m:t>𝑝</m:t>
                             </m:r>
                             <m:r>
-                              <a:rPr lang="en-US" sz="900" i="1">
+                              <a:rPr lang="en-US" sz="800" i="1">
                                 <a:latin typeface="Cambria Math" panose="02040503050406030204" pitchFamily="18" charset="0"/>
                                 <a:ea typeface="Cambria Math" panose="02040503050406030204" pitchFamily="18" charset="0"/>
                               </a:rPr>
@@ -12409,7 +12458,7 @@
                           </m:sup>
                         </m:sSubSup>
                         <m:r>
-                          <a:rPr lang="en-US" sz="900" i="1">
+                          <a:rPr lang="en-US" sz="800" i="1">
                             <a:latin typeface="Cambria Math" panose="02040503050406030204" pitchFamily="18" charset="0"/>
                             <a:ea typeface="Cambria Math" panose="02040503050406030204" pitchFamily="18" charset="0"/>
                           </a:rPr>
@@ -12418,7 +12467,7 @@
                         <m:sSubSup>
                           <m:sSubSupPr>
                             <m:ctrlPr>
-                              <a:rPr lang="en-US" sz="900" i="1">
+                              <a:rPr lang="en-US" sz="800" i="1">
                                 <a:latin typeface="Cambria Math" panose="02040503050406030204" pitchFamily="18" charset="0"/>
                                 <a:ea typeface="Cambria Math" panose="02040503050406030204" pitchFamily="18" charset="0"/>
                               </a:rPr>
@@ -12426,7 +12475,7 @@
                           </m:sSubSupPr>
                           <m:e>
                             <m:r>
-                              <a:rPr lang="en-US" sz="900" i="1">
+                              <a:rPr lang="en-US" sz="800" i="1">
                                 <a:latin typeface="Cambria Math" panose="02040503050406030204" pitchFamily="18" charset="0"/>
                                 <a:ea typeface="Cambria Math" panose="02040503050406030204" pitchFamily="18" charset="0"/>
                               </a:rPr>
@@ -12435,7 +12484,7 @@
                           </m:e>
                           <m:sub>
                             <m:r>
-                              <a:rPr lang="en-US" sz="900" i="1">
+                              <a:rPr lang="en-US" sz="800" i="1">
                                 <a:latin typeface="Cambria Math" panose="02040503050406030204" pitchFamily="18" charset="0"/>
                                 <a:ea typeface="Cambria Math" panose="02040503050406030204" pitchFamily="18" charset="0"/>
                               </a:rPr>
@@ -12444,14 +12493,14 @@
                           </m:sub>
                           <m:sup>
                             <m:r>
-                              <a:rPr lang="en-US" sz="900" i="1">
+                              <a:rPr lang="en-US" sz="800" i="1">
                                 <a:latin typeface="Cambria Math" panose="02040503050406030204" pitchFamily="18" charset="0"/>
                                 <a:ea typeface="Cambria Math" panose="02040503050406030204" pitchFamily="18" charset="0"/>
                               </a:rPr>
                               <m:t>𝑝</m:t>
                             </m:r>
                             <m:r>
-                              <a:rPr lang="en-US" sz="900" i="1">
+                              <a:rPr lang="en-US" sz="800" i="1">
                                 <a:latin typeface="Cambria Math" panose="02040503050406030204" pitchFamily="18" charset="0"/>
                                 <a:ea typeface="Cambria Math" panose="02040503050406030204" pitchFamily="18" charset="0"/>
                               </a:rPr>
@@ -12463,18 +12512,11 @@
                     </m:d>
                   </m:oMath>
                 </a14:m>
-                <a:r>
-                  <a:rPr lang="en-US" sz="900" dirty="0" smtClean="0"/>
-                  <a:t> (logical or)</a:t>
-                </a:r>
-              </a:p>
-              <a:p>
-                <a:pPr lvl="1"/>
-                <a:endParaRPr lang="en-US" sz="900" dirty="0"/>
+                <a:endParaRPr lang="en-US" sz="800" dirty="0"/>
               </a:p>
               <a:p>
                 <a:r>
-                  <a:rPr lang="en-US" sz="900" dirty="0" smtClean="0"/>
+                  <a:rPr lang="en-US" sz="800" dirty="0" smtClean="0"/>
                   <a:t>Auxiliary party can calculate </a:t>
                 </a:r>
                 <a14:m>
@@ -12482,7 +12524,7 @@
                     <m:sSup>
                       <m:sSupPr>
                         <m:ctrlPr>
-                          <a:rPr lang="en-US" sz="900" i="1">
+                          <a:rPr lang="en-US" sz="800" i="1">
                             <a:latin typeface="Cambria Math" panose="02040503050406030204" pitchFamily="18" charset="0"/>
                             <a:ea typeface="Cambria Math" panose="02040503050406030204" pitchFamily="18" charset="0"/>
                           </a:rPr>
@@ -12490,35 +12532,35 @@
                       </m:sSupPr>
                       <m:e>
                         <m:r>
-                          <a:rPr lang="en-US" sz="900" i="1">
+                          <a:rPr lang="en-US" sz="800" i="1">
                             <a:latin typeface="Cambria Math" panose="02040503050406030204" pitchFamily="18" charset="0"/>
                             <a:ea typeface="Cambria Math" panose="02040503050406030204" pitchFamily="18" charset="0"/>
                           </a:rPr>
                           <m:t>(</m:t>
                         </m:r>
                         <m:r>
-                          <a:rPr lang="en-US" sz="900" i="1">
+                          <a:rPr lang="en-US" sz="800" i="1">
                             <a:latin typeface="Cambria Math" panose="02040503050406030204" pitchFamily="18" charset="0"/>
                             <a:ea typeface="Cambria Math" panose="02040503050406030204" pitchFamily="18" charset="0"/>
                           </a:rPr>
                           <m:t>𝐴</m:t>
                         </m:r>
                         <m:r>
-                          <a:rPr lang="en-US" sz="900" i="1">
+                          <a:rPr lang="en-US" sz="800" i="1">
                             <a:latin typeface="Cambria Math" panose="02040503050406030204" pitchFamily="18" charset="0"/>
                             <a:ea typeface="Cambria Math" panose="02040503050406030204" pitchFamily="18" charset="0"/>
                           </a:rPr>
                           <m:t>∗</m:t>
                         </m:r>
                         <m:r>
-                          <a:rPr lang="en-US" sz="900" i="1">
+                          <a:rPr lang="en-US" sz="800" i="1">
                             <a:latin typeface="Cambria Math" panose="02040503050406030204" pitchFamily="18" charset="0"/>
                             <a:ea typeface="Cambria Math" panose="02040503050406030204" pitchFamily="18" charset="0"/>
                           </a:rPr>
                           <m:t>𝐵</m:t>
                         </m:r>
                         <m:r>
-                          <a:rPr lang="en-US" sz="900" i="1">
+                          <a:rPr lang="en-US" sz="800" i="1">
                             <a:latin typeface="Cambria Math" panose="02040503050406030204" pitchFamily="18" charset="0"/>
                             <a:ea typeface="Cambria Math" panose="02040503050406030204" pitchFamily="18" charset="0"/>
                           </a:rPr>
@@ -12527,7 +12569,7 @@
                       </m:e>
                       <m:sup>
                         <m:r>
-                          <a:rPr lang="en-US" sz="900" i="1">
+                          <a:rPr lang="en-US" sz="800" i="1">
                             <a:latin typeface="Cambria Math" panose="02040503050406030204" pitchFamily="18" charset="0"/>
                             <a:ea typeface="Cambria Math" panose="02040503050406030204" pitchFamily="18" charset="0"/>
                           </a:rPr>
@@ -12538,12 +12580,12 @@
                   </m:oMath>
                 </a14:m>
                 <a:r>
-                  <a:rPr lang="en-US" sz="900" dirty="0" smtClean="0"/>
+                  <a:rPr lang="en-US" sz="800" dirty="0" smtClean="0"/>
                   <a:t> locally</a:t>
                 </a:r>
               </a:p>
               <a:p>
-                <a:endParaRPr lang="en-US" sz="900" dirty="0" smtClean="0"/>
+                <a:endParaRPr lang="en-US" sz="800" dirty="0" smtClean="0"/>
               </a:p>
               <a:p>
                 <a14:m>
@@ -12551,7 +12593,7 @@
                     <m:sSub>
                       <m:sSubPr>
                         <m:ctrlPr>
-                          <a:rPr lang="en-US" sz="900" i="1">
+                          <a:rPr lang="en-US" sz="800" i="1">
                             <a:latin typeface="Cambria Math" panose="02040503050406030204" pitchFamily="18" charset="0"/>
                             <a:ea typeface="Cambria Math" panose="02040503050406030204" pitchFamily="18" charset="0"/>
                           </a:rPr>
@@ -12559,21 +12601,21 @@
                       </m:sSubPr>
                       <m:e>
                         <m:r>
-                          <a:rPr lang="en-US" sz="900" i="1">
+                          <a:rPr lang="en-US" sz="800" i="1">
                             <a:latin typeface="Cambria Math" panose="02040503050406030204" pitchFamily="18" charset="0"/>
                             <a:ea typeface="Cambria Math" panose="02040503050406030204" pitchFamily="18" charset="0"/>
                           </a:rPr>
                           <m:t>𝐶</m:t>
                         </m:r>
                         <m:r>
-                          <a:rPr lang="en-US" sz="900" i="1">
+                          <a:rPr lang="en-US" sz="800" i="1">
                             <a:latin typeface="Cambria Math" panose="02040503050406030204" pitchFamily="18" charset="0"/>
                             <a:ea typeface="Cambria Math" panose="02040503050406030204" pitchFamily="18" charset="0"/>
                           </a:rPr>
                           <m:t>=</m:t>
                         </m:r>
                         <m:r>
-                          <a:rPr lang="en-US" sz="900" i="1">
+                          <a:rPr lang="en-US" sz="800" i="1">
                             <a:latin typeface="Cambria Math" panose="02040503050406030204" pitchFamily="18" charset="0"/>
                             <a:ea typeface="Cambria Math" panose="02040503050406030204" pitchFamily="18" charset="0"/>
                           </a:rPr>
@@ -12582,7 +12624,7 @@
                       </m:e>
                       <m:sub>
                         <m:r>
-                          <a:rPr lang="en-US" sz="900" i="1">
+                          <a:rPr lang="en-US" sz="800" i="1">
                             <a:latin typeface="Cambria Math" panose="02040503050406030204" pitchFamily="18" charset="0"/>
                             <a:ea typeface="Cambria Math" panose="02040503050406030204" pitchFamily="18" charset="0"/>
                           </a:rPr>
@@ -12592,14 +12634,14 @@
                     </m:sSub>
                   </m:oMath>
                 </a14:m>
-                <a:endParaRPr lang="en-US" sz="900" dirty="0" smtClean="0">
+                <a:endParaRPr lang="en-US" sz="800" dirty="0" smtClean="0">
                   <a:ea typeface="Cambria Math" panose="02040503050406030204" pitchFamily="18" charset="0"/>
                 </a:endParaRPr>
               </a:p>
               <a:p>
                 <a:pPr lvl="1"/>
                 <a:r>
-                  <a:rPr lang="en-US" sz="900" dirty="0" smtClean="0">
+                  <a:rPr lang="en-US" sz="800" dirty="0" smtClean="0">
                     <a:ea typeface="Cambria Math" panose="02040503050406030204" pitchFamily="18" charset="0"/>
                   </a:rPr>
                   <a:t>Locally calculate </a:t>
@@ -12609,7 +12651,7 @@
                     <m:sSup>
                       <m:sSupPr>
                         <m:ctrlPr>
-                          <a:rPr lang="en-US" sz="900" i="1" smtClean="0">
+                          <a:rPr lang="en-US" sz="800" i="1" smtClean="0">
                             <a:latin typeface="Cambria Math" panose="02040503050406030204" pitchFamily="18" charset="0"/>
                             <a:ea typeface="Cambria Math" panose="02040503050406030204" pitchFamily="18" charset="0"/>
                           </a:rPr>
@@ -12617,35 +12659,35 @@
                       </m:sSupPr>
                       <m:e>
                         <m:r>
-                          <a:rPr lang="en-US" sz="900" b="0" i="1" smtClean="0">
+                          <a:rPr lang="en-US" sz="800" b="0" i="1" smtClean="0">
                             <a:latin typeface="Cambria Math" panose="02040503050406030204" pitchFamily="18" charset="0"/>
                             <a:ea typeface="Cambria Math" panose="02040503050406030204" pitchFamily="18" charset="0"/>
                           </a:rPr>
                           <m:t>(</m:t>
                         </m:r>
                         <m:r>
-                          <a:rPr lang="en-US" sz="900" b="0" i="1" smtClean="0">
+                          <a:rPr lang="en-US" sz="800" b="0" i="1" smtClean="0">
                             <a:latin typeface="Cambria Math" panose="02040503050406030204" pitchFamily="18" charset="0"/>
                             <a:ea typeface="Cambria Math" panose="02040503050406030204" pitchFamily="18" charset="0"/>
                           </a:rPr>
                           <m:t>𝐴</m:t>
                         </m:r>
                         <m:r>
-                          <a:rPr lang="en-US" sz="900" b="0" i="1" smtClean="0">
+                          <a:rPr lang="en-US" sz="800" b="0" i="1" smtClean="0">
                             <a:latin typeface="Cambria Math" panose="02040503050406030204" pitchFamily="18" charset="0"/>
                             <a:ea typeface="Cambria Math" panose="02040503050406030204" pitchFamily="18" charset="0"/>
                           </a:rPr>
                           <m:t>∗</m:t>
                         </m:r>
                         <m:r>
-                          <a:rPr lang="en-US" sz="900" b="0" i="1" smtClean="0">
+                          <a:rPr lang="en-US" sz="800" b="0" i="1" smtClean="0">
                             <a:latin typeface="Cambria Math" panose="02040503050406030204" pitchFamily="18" charset="0"/>
                             <a:ea typeface="Cambria Math" panose="02040503050406030204" pitchFamily="18" charset="0"/>
                           </a:rPr>
                           <m:t>𝐵</m:t>
                         </m:r>
                         <m:r>
-                          <a:rPr lang="en-US" sz="900" b="0" i="1" smtClean="0">
+                          <a:rPr lang="en-US" sz="800" b="0" i="1" smtClean="0">
                             <a:latin typeface="Cambria Math" panose="02040503050406030204" pitchFamily="18" charset="0"/>
                             <a:ea typeface="Cambria Math" panose="02040503050406030204" pitchFamily="18" charset="0"/>
                           </a:rPr>
@@ -12654,7 +12696,7 @@
                       </m:e>
                       <m:sup>
                         <m:r>
-                          <a:rPr lang="en-US" sz="900" b="0" i="1" smtClean="0">
+                          <a:rPr lang="en-US" sz="800" b="0" i="1" smtClean="0">
                             <a:latin typeface="Cambria Math" panose="02040503050406030204" pitchFamily="18" charset="0"/>
                             <a:ea typeface="Cambria Math" panose="02040503050406030204" pitchFamily="18" charset="0"/>
                           </a:rPr>
@@ -12663,7 +12705,7 @@
                       </m:sup>
                     </m:sSup>
                     <m:r>
-                      <a:rPr lang="en-US" sz="900" b="0" i="1" smtClean="0">
+                      <a:rPr lang="en-US" sz="800" b="0" i="1" smtClean="0">
                         <a:latin typeface="Cambria Math" panose="02040503050406030204" pitchFamily="18" charset="0"/>
                         <a:ea typeface="Cambria Math" panose="02040503050406030204" pitchFamily="18" charset="0"/>
                       </a:rPr>
@@ -12672,7 +12714,7 @@
                     <m:sSub>
                       <m:sSubPr>
                         <m:ctrlPr>
-                          <a:rPr lang="en-US" sz="900" i="1">
+                          <a:rPr lang="en-US" sz="800" i="1">
                             <a:latin typeface="Cambria Math" panose="02040503050406030204" pitchFamily="18" charset="0"/>
                             <a:ea typeface="Cambria Math" panose="02040503050406030204" pitchFamily="18" charset="0"/>
                           </a:rPr>
@@ -12680,7 +12722,7 @@
                       </m:sSubPr>
                       <m:e>
                         <m:r>
-                          <a:rPr lang="en-US" sz="900" i="1">
+                          <a:rPr lang="en-US" sz="800" i="1">
                             <a:latin typeface="Cambria Math" panose="02040503050406030204" pitchFamily="18" charset="0"/>
                             <a:ea typeface="Cambria Math" panose="02040503050406030204" pitchFamily="18" charset="0"/>
                           </a:rPr>
@@ -12689,7 +12731,7 @@
                       </m:e>
                       <m:sub>
                         <m:r>
-                          <a:rPr lang="en-US" sz="900" i="1">
+                          <a:rPr lang="en-US" sz="800" i="1">
                             <a:latin typeface="Cambria Math" panose="02040503050406030204" pitchFamily="18" charset="0"/>
                             <a:ea typeface="Cambria Math" panose="02040503050406030204" pitchFamily="18" charset="0"/>
                           </a:rPr>
@@ -12700,13 +12742,13 @@
                   </m:oMath>
                 </a14:m>
                 <a:r>
-                  <a:rPr lang="en-US" sz="900" dirty="0" smtClean="0">
+                  <a:rPr lang="en-US" sz="800" dirty="0" smtClean="0">
                     <a:ea typeface="Cambria Math" panose="02040503050406030204" pitchFamily="18" charset="0"/>
                   </a:rPr>
                   <a:t>, where you use a vector</a:t>
                 </a:r>
                 <a:r>
-                  <a:rPr lang="en-US" sz="900" dirty="0">
+                  <a:rPr lang="en-US" sz="800" dirty="0">
                     <a:ea typeface="Cambria Math" panose="02040503050406030204" pitchFamily="18" charset="0"/>
                   </a:rPr>
                   <a:t> </a:t>
@@ -12716,7 +12758,7 @@
                     <m:sSub>
                       <m:sSubPr>
                         <m:ctrlPr>
-                          <a:rPr lang="en-US" sz="900" i="1">
+                          <a:rPr lang="en-US" sz="800" i="1">
                             <a:latin typeface="Cambria Math" panose="02040503050406030204" pitchFamily="18" charset="0"/>
                             <a:ea typeface="Cambria Math" panose="02040503050406030204" pitchFamily="18" charset="0"/>
                           </a:rPr>
@@ -12724,7 +12766,7 @@
                       </m:sSubPr>
                       <m:e>
                         <m:r>
-                          <a:rPr lang="en-US" sz="900" i="1">
+                          <a:rPr lang="en-US" sz="800" i="1">
                             <a:latin typeface="Cambria Math" panose="02040503050406030204" pitchFamily="18" charset="0"/>
                             <a:ea typeface="Cambria Math" panose="02040503050406030204" pitchFamily="18" charset="0"/>
                           </a:rPr>
@@ -12733,7 +12775,7 @@
                       </m:e>
                       <m:sub>
                         <m:r>
-                          <a:rPr lang="en-US" sz="900" b="0" i="1" smtClean="0">
+                          <a:rPr lang="en-US" sz="800" b="0" i="1" smtClean="0">
                             <a:latin typeface="Cambria Math" panose="02040503050406030204" pitchFamily="18" charset="0"/>
                             <a:ea typeface="Cambria Math" panose="02040503050406030204" pitchFamily="18" charset="0"/>
                           </a:rPr>
@@ -12744,18 +12786,18 @@
                   </m:oMath>
                 </a14:m>
                 <a:r>
-                  <a:rPr lang="en-US" sz="900" dirty="0" smtClean="0">
+                  <a:rPr lang="en-US" sz="800" dirty="0" smtClean="0">
                     <a:ea typeface="Cambria Math" panose="02040503050406030204" pitchFamily="18" charset="0"/>
                   </a:rPr>
                   <a:t>for each party </a:t>
                 </a:r>
                 <a:br>
-                  <a:rPr lang="en-US" sz="900" dirty="0" smtClean="0">
+                  <a:rPr lang="en-US" sz="800" dirty="0" smtClean="0">
                     <a:ea typeface="Cambria Math" panose="02040503050406030204" pitchFamily="18" charset="0"/>
                   </a:rPr>
                 </a:br>
                 <a:r>
-                  <a:rPr lang="en-US" sz="900" dirty="0" smtClean="0">
+                  <a:rPr lang="en-US" sz="800" dirty="0" smtClean="0">
                     <a:ea typeface="Cambria Math" panose="02040503050406030204" pitchFamily="18" charset="0"/>
                   </a:rPr>
                   <a:t>where </a:t>
@@ -12765,7 +12807,7 @@
                     <m:sSub>
                       <m:sSubPr>
                         <m:ctrlPr>
-                          <a:rPr lang="en-US" sz="900" i="1">
+                          <a:rPr lang="en-US" sz="800" i="1">
                             <a:latin typeface="Cambria Math" panose="02040503050406030204" pitchFamily="18" charset="0"/>
                             <a:ea typeface="Cambria Math" panose="02040503050406030204" pitchFamily="18" charset="0"/>
                           </a:rPr>
@@ -12773,7 +12815,7 @@
                       </m:sSubPr>
                       <m:e>
                         <m:r>
-                          <a:rPr lang="en-US" sz="900" b="0" i="1" smtClean="0">
+                          <a:rPr lang="en-US" sz="800" b="0" i="1" smtClean="0">
                             <a:latin typeface="Cambria Math" panose="02040503050406030204" pitchFamily="18" charset="0"/>
                             <a:ea typeface="Cambria Math" panose="02040503050406030204" pitchFamily="18" charset="0"/>
                           </a:rPr>
@@ -12782,7 +12824,7 @@
                       </m:e>
                       <m:sub>
                         <m:r>
-                          <a:rPr lang="en-US" sz="900" i="1">
+                          <a:rPr lang="en-US" sz="800" i="1">
                             <a:latin typeface="Cambria Math" panose="02040503050406030204" pitchFamily="18" charset="0"/>
                             <a:ea typeface="Cambria Math" panose="02040503050406030204" pitchFamily="18" charset="0"/>
                           </a:rPr>
@@ -12791,7 +12833,7 @@
                       </m:sub>
                     </m:sSub>
                     <m:r>
-                      <a:rPr lang="en-US" sz="900" i="1">
+                      <a:rPr lang="en-US" sz="800" i="1">
                         <a:latin typeface="Cambria Math" panose="02040503050406030204" pitchFamily="18" charset="0"/>
                       </a:rPr>
                       <m:t>= </m:t>
@@ -12799,14 +12841,14 @@
                     <m:sSubSup>
                       <m:sSubSupPr>
                         <m:ctrlPr>
-                          <a:rPr lang="en-US" sz="900" i="1">
+                          <a:rPr lang="en-US" sz="800" i="1">
                             <a:latin typeface="Cambria Math" panose="02040503050406030204" pitchFamily="18" charset="0"/>
                           </a:rPr>
                         </m:ctrlPr>
                       </m:sSubSupPr>
                       <m:e>
                         <m:r>
-                          <a:rPr lang="en-US" sz="900" i="1">
+                          <a:rPr lang="en-US" sz="800" i="1">
                             <a:latin typeface="Cambria Math" panose="02040503050406030204" pitchFamily="18" charset="0"/>
                           </a:rPr>
                           <m:t>{</m:t>
@@ -12816,7 +12858,7 @@
                         <m:sSub>
                           <m:sSubPr>
                             <m:ctrlPr>
-                              <a:rPr lang="en-US" sz="900" i="1">
+                              <a:rPr lang="en-US" sz="800" i="1">
                                 <a:latin typeface="Cambria Math" panose="02040503050406030204" pitchFamily="18" charset="0"/>
                                 <a:ea typeface="Cambria Math" panose="02040503050406030204" pitchFamily="18" charset="0"/>
                               </a:rPr>
@@ -12824,14 +12866,14 @@
                           </m:sSubPr>
                           <m:e>
                             <m:r>
-                              <a:rPr lang="en-US" sz="900" i="1">
+                              <a:rPr lang="en-US" sz="800" i="1">
                                 <a:latin typeface="Cambria Math" panose="02040503050406030204" pitchFamily="18" charset="0"/>
                                 <a:ea typeface="Cambria Math" panose="02040503050406030204" pitchFamily="18" charset="0"/>
                               </a:rPr>
                               <m:t> </m:t>
                             </m:r>
                             <m:r>
-                              <a:rPr lang="en-US" sz="900" i="1">
+                              <a:rPr lang="en-US" sz="800" i="1">
                                 <a:latin typeface="Cambria Math" panose="02040503050406030204" pitchFamily="18" charset="0"/>
                                 <a:ea typeface="Cambria Math" panose="02040503050406030204" pitchFamily="18" charset="0"/>
                               </a:rPr>
@@ -12840,7 +12882,7 @@
                           </m:e>
                           <m:sub>
                             <m:r>
-                              <a:rPr lang="en-US" sz="900" i="1">
+                              <a:rPr lang="en-US" sz="800" i="1">
                                 <a:latin typeface="Cambria Math" panose="02040503050406030204" pitchFamily="18" charset="0"/>
                                 <a:ea typeface="Cambria Math" panose="02040503050406030204" pitchFamily="18" charset="0"/>
                               </a:rPr>
@@ -12849,14 +12891,14 @@
                           </m:sub>
                         </m:sSub>
                         <m:r>
-                          <a:rPr lang="en-US" sz="900" b="0" i="1" smtClean="0">
+                          <a:rPr lang="en-US" sz="800" b="0" i="1" smtClean="0">
                             <a:latin typeface="Cambria Math" panose="02040503050406030204" pitchFamily="18" charset="0"/>
                             <a:ea typeface="Cambria Math" panose="02040503050406030204" pitchFamily="18" charset="0"/>
                           </a:rPr>
                           <m:t> </m:t>
                         </m:r>
                         <m:r>
-                          <a:rPr lang="en-US" sz="900" i="1">
+                          <a:rPr lang="en-US" sz="800" i="1">
                             <a:latin typeface="Cambria Math" panose="02040503050406030204" pitchFamily="18" charset="0"/>
                           </a:rPr>
                           <m:t>𝑖𝑓</m:t>
@@ -12864,7 +12906,7 @@
                         <m:sSub>
                           <m:sSubPr>
                             <m:ctrlPr>
-                              <a:rPr lang="en-US" sz="900" i="1">
+                              <a:rPr lang="en-US" sz="800" i="1">
                                 <a:latin typeface="Cambria Math" panose="02040503050406030204" pitchFamily="18" charset="0"/>
                                 <a:ea typeface="Cambria Math" panose="02040503050406030204" pitchFamily="18" charset="0"/>
                               </a:rPr>
@@ -12872,14 +12914,14 @@
                           </m:sSubPr>
                           <m:e>
                             <m:r>
-                              <a:rPr lang="en-US" sz="900" i="1">
+                              <a:rPr lang="en-US" sz="800" i="1">
                                 <a:latin typeface="Cambria Math" panose="02040503050406030204" pitchFamily="18" charset="0"/>
                                 <a:ea typeface="Cambria Math" panose="02040503050406030204" pitchFamily="18" charset="0"/>
                               </a:rPr>
                               <m:t> </m:t>
                             </m:r>
                             <m:r>
-                              <a:rPr lang="en-US" sz="900" i="1">
+                              <a:rPr lang="en-US" sz="800" i="1">
                                 <a:latin typeface="Cambria Math" panose="02040503050406030204" pitchFamily="18" charset="0"/>
                                 <a:ea typeface="Cambria Math" panose="02040503050406030204" pitchFamily="18" charset="0"/>
                               </a:rPr>
@@ -12888,7 +12930,7 @@
                           </m:e>
                           <m:sub>
                             <m:r>
-                              <a:rPr lang="en-US" sz="900" i="1">
+                              <a:rPr lang="en-US" sz="800" i="1">
                                 <a:latin typeface="Cambria Math" panose="02040503050406030204" pitchFamily="18" charset="0"/>
                                 <a:ea typeface="Cambria Math" panose="02040503050406030204" pitchFamily="18" charset="0"/>
                               </a:rPr>
@@ -12897,42 +12939,42 @@
                           </m:sub>
                         </m:sSub>
                         <m:r>
-                          <a:rPr lang="en-US" sz="900" b="0" i="1" smtClean="0">
+                          <a:rPr lang="en-US" sz="800" b="0" i="1" smtClean="0">
                             <a:latin typeface="Cambria Math" panose="02040503050406030204" pitchFamily="18" charset="0"/>
                             <a:ea typeface="Cambria Math" panose="02040503050406030204" pitchFamily="18" charset="0"/>
                           </a:rPr>
                           <m:t> </m:t>
                         </m:r>
                         <m:r>
-                          <a:rPr lang="en-US" sz="900" i="1">
+                          <a:rPr lang="en-US" sz="800" i="1">
                             <a:latin typeface="Cambria Math" panose="02040503050406030204" pitchFamily="18" charset="0"/>
                             <a:ea typeface="Cambria Math" panose="02040503050406030204" pitchFamily="18" charset="0"/>
                           </a:rPr>
                           <m:t>𝑖𝑠</m:t>
                         </m:r>
                         <m:r>
-                          <a:rPr lang="en-US" sz="900" i="1">
+                          <a:rPr lang="en-US" sz="800" i="1">
                             <a:latin typeface="Cambria Math" panose="02040503050406030204" pitchFamily="18" charset="0"/>
                             <a:ea typeface="Cambria Math" panose="02040503050406030204" pitchFamily="18" charset="0"/>
                           </a:rPr>
                           <m:t> </m:t>
                         </m:r>
                         <m:r>
-                          <a:rPr lang="en-US" sz="900" i="1">
+                          <a:rPr lang="en-US" sz="800" i="1">
                             <a:latin typeface="Cambria Math" panose="02040503050406030204" pitchFamily="18" charset="0"/>
                             <a:ea typeface="Cambria Math" panose="02040503050406030204" pitchFamily="18" charset="0"/>
                           </a:rPr>
                           <m:t>𝑙𝑜𝑐𝑎𝑙𝑙𝑦</m:t>
                         </m:r>
                         <m:r>
-                          <a:rPr lang="en-US" sz="900" i="1">
+                          <a:rPr lang="en-US" sz="800" i="1">
                             <a:latin typeface="Cambria Math" panose="02040503050406030204" pitchFamily="18" charset="0"/>
                             <a:ea typeface="Cambria Math" panose="02040503050406030204" pitchFamily="18" charset="0"/>
                           </a:rPr>
                           <m:t> </m:t>
                         </m:r>
                         <m:r>
-                          <a:rPr lang="en-US" sz="900" i="1">
+                          <a:rPr lang="en-US" sz="800" i="1">
                             <a:latin typeface="Cambria Math" panose="02040503050406030204" pitchFamily="18" charset="0"/>
                             <a:ea typeface="Cambria Math" panose="02040503050406030204" pitchFamily="18" charset="0"/>
                           </a:rPr>
@@ -12941,20 +12983,20 @@
                       </m:sub>
                       <m:sup>
                         <m:r>
-                          <a:rPr lang="en-US" sz="900" b="0" i="1" smtClean="0">
+                          <a:rPr lang="en-US" sz="800" b="0" i="1" smtClean="0">
                             <a:latin typeface="Cambria Math" panose="02040503050406030204" pitchFamily="18" charset="0"/>
                             <a:ea typeface="Cambria Math" panose="02040503050406030204" pitchFamily="18" charset="0"/>
                           </a:rPr>
                           <m:t>0</m:t>
                         </m:r>
                         <m:r>
-                          <a:rPr lang="en-US" sz="900" i="1">
+                          <a:rPr lang="en-US" sz="800" i="1">
                             <a:latin typeface="Cambria Math" panose="02040503050406030204" pitchFamily="18" charset="0"/>
                           </a:rPr>
                           <m:t> </m:t>
                         </m:r>
                         <m:r>
-                          <a:rPr lang="en-US" sz="900" i="1">
+                          <a:rPr lang="en-US" sz="800" i="1">
                             <a:latin typeface="Cambria Math" panose="02040503050406030204" pitchFamily="18" charset="0"/>
                           </a:rPr>
                           <m:t>𝑖𝑓</m:t>
@@ -12962,7 +13004,7 @@
                         <m:sSub>
                           <m:sSubPr>
                             <m:ctrlPr>
-                              <a:rPr lang="en-US" sz="900" i="1">
+                              <a:rPr lang="en-US" sz="800" i="1">
                                 <a:latin typeface="Cambria Math" panose="02040503050406030204" pitchFamily="18" charset="0"/>
                                 <a:ea typeface="Cambria Math" panose="02040503050406030204" pitchFamily="18" charset="0"/>
                               </a:rPr>
@@ -12970,14 +13012,14 @@
                           </m:sSubPr>
                           <m:e>
                             <m:r>
-                              <a:rPr lang="en-US" sz="900" i="1">
+                              <a:rPr lang="en-US" sz="800" i="1">
                                 <a:latin typeface="Cambria Math" panose="02040503050406030204" pitchFamily="18" charset="0"/>
                                 <a:ea typeface="Cambria Math" panose="02040503050406030204" pitchFamily="18" charset="0"/>
                               </a:rPr>
                               <m:t> </m:t>
                             </m:r>
                             <m:r>
-                              <a:rPr lang="en-US" sz="900" i="1">
+                              <a:rPr lang="en-US" sz="800" i="1">
                                 <a:latin typeface="Cambria Math" panose="02040503050406030204" pitchFamily="18" charset="0"/>
                                 <a:ea typeface="Cambria Math" panose="02040503050406030204" pitchFamily="18" charset="0"/>
                               </a:rPr>
@@ -12986,7 +13028,7 @@
                           </m:e>
                           <m:sub>
                             <m:r>
-                              <a:rPr lang="en-US" sz="900" i="1">
+                              <a:rPr lang="en-US" sz="800" i="1">
                                 <a:latin typeface="Cambria Math" panose="02040503050406030204" pitchFamily="18" charset="0"/>
                                 <a:ea typeface="Cambria Math" panose="02040503050406030204" pitchFamily="18" charset="0"/>
                               </a:rPr>
@@ -12995,49 +13037,49 @@
                           </m:sub>
                         </m:sSub>
                         <m:r>
-                          <a:rPr lang="en-US" sz="900" i="1">
+                          <a:rPr lang="en-US" sz="800" i="1">
                             <a:latin typeface="Cambria Math" panose="02040503050406030204" pitchFamily="18" charset="0"/>
                             <a:ea typeface="Cambria Math" panose="02040503050406030204" pitchFamily="18" charset="0"/>
                           </a:rPr>
                           <m:t>𝑖𝑠</m:t>
                         </m:r>
                         <m:r>
-                          <a:rPr lang="en-US" sz="900" i="1">
+                          <a:rPr lang="en-US" sz="800" i="1">
                             <a:latin typeface="Cambria Math" panose="02040503050406030204" pitchFamily="18" charset="0"/>
                             <a:ea typeface="Cambria Math" panose="02040503050406030204" pitchFamily="18" charset="0"/>
                           </a:rPr>
                           <m:t> </m:t>
                         </m:r>
                         <m:r>
-                          <a:rPr lang="en-US" sz="900" i="1">
+                          <a:rPr lang="en-US" sz="800" i="1">
                             <a:latin typeface="Cambria Math" panose="02040503050406030204" pitchFamily="18" charset="0"/>
                             <a:ea typeface="Cambria Math" panose="02040503050406030204" pitchFamily="18" charset="0"/>
                           </a:rPr>
                           <m:t>𝑛𝑜𝑡</m:t>
                         </m:r>
                         <m:r>
-                          <a:rPr lang="en-US" sz="900" i="1">
+                          <a:rPr lang="en-US" sz="800" i="1">
                             <a:latin typeface="Cambria Math" panose="02040503050406030204" pitchFamily="18" charset="0"/>
                             <a:ea typeface="Cambria Math" panose="02040503050406030204" pitchFamily="18" charset="0"/>
                           </a:rPr>
                           <m:t> </m:t>
                         </m:r>
                         <m:r>
-                          <a:rPr lang="en-US" sz="900" i="1">
+                          <a:rPr lang="en-US" sz="800" i="1">
                             <a:latin typeface="Cambria Math" panose="02040503050406030204" pitchFamily="18" charset="0"/>
                             <a:ea typeface="Cambria Math" panose="02040503050406030204" pitchFamily="18" charset="0"/>
                           </a:rPr>
                           <m:t>𝑙𝑜𝑐𝑎𝑙𝑙𝑦</m:t>
                         </m:r>
                         <m:r>
-                          <a:rPr lang="en-US" sz="900" i="1">
+                          <a:rPr lang="en-US" sz="800" i="1">
                             <a:latin typeface="Cambria Math" panose="02040503050406030204" pitchFamily="18" charset="0"/>
                             <a:ea typeface="Cambria Math" panose="02040503050406030204" pitchFamily="18" charset="0"/>
                           </a:rPr>
                           <m:t> </m:t>
                         </m:r>
                         <m:r>
-                          <a:rPr lang="en-US" sz="900" i="1">
+                          <a:rPr lang="en-US" sz="800" i="1">
                             <a:latin typeface="Cambria Math" panose="02040503050406030204" pitchFamily="18" charset="0"/>
                             <a:ea typeface="Cambria Math" panose="02040503050406030204" pitchFamily="18" charset="0"/>
                           </a:rPr>
@@ -13047,26 +13089,26 @@
                     </m:sSubSup>
                   </m:oMath>
                 </a14:m>
-                <a:endParaRPr lang="en-US" sz="900" dirty="0" smtClean="0"/>
+                <a:endParaRPr lang="en-US" sz="800" dirty="0" smtClean="0"/>
               </a:p>
               <a:p>
                 <a:pPr lvl="1"/>
                 <a:r>
-                  <a:rPr lang="en-US" sz="900" dirty="0" smtClean="0"/>
+                  <a:rPr lang="en-US" sz="800" dirty="0" smtClean="0"/>
                   <a:t>Sum the local results</a:t>
                 </a:r>
               </a:p>
               <a:p>
-                <a:endParaRPr lang="nl-NL" sz="900" dirty="0" smtClean="0"/>
+                <a:endParaRPr lang="nl-NL" sz="800" dirty="0" smtClean="0"/>
               </a:p>
               <a:p>
-                <a:endParaRPr lang="en-US" sz="900" dirty="0" smtClean="0"/>
+                <a:endParaRPr lang="en-US" sz="800" dirty="0" smtClean="0"/>
               </a:p>
               <a:p>
-                <a:endParaRPr lang="nl-NL" sz="900" dirty="0" smtClean="0"/>
+                <a:endParaRPr lang="nl-NL" sz="800" dirty="0" smtClean="0"/>
               </a:p>
               <a:p>
-                <a:endParaRPr lang="nl-NL" sz="900" dirty="0"/>
+                <a:endParaRPr lang="nl-NL" sz="800" dirty="0"/>
               </a:p>
             </p:txBody>
           </p:sp>
@@ -13090,7 +13132,7 @@
               <a:blipFill>
                 <a:blip r:embed="rId2"/>
                 <a:stretch>
-                  <a:fillRect l="-1717" t="-4858" r="-1414"/>
+                  <a:fillRect l="-1717" t="-6030" r="-1515"/>
                 </a:stretch>
               </a:blipFill>
             </p:spPr>
@@ -13686,7 +13728,7 @@
           <a:blip r:embed="rId4">
             <a:extLst>
               <a:ext uri="{96DAC541-7B7A-43D3-8B79-37D633B846F1}">
-                <asvg:svgBlip xmlns:asvg="http://schemas.microsoft.com/office/drawing/2016/SVG/main" xmlns="" r:embed="rId5"/>
+                <asvg:svgBlip xmlns="" xmlns:asvg="http://schemas.microsoft.com/office/drawing/2016/SVG/main" r:embed="rId5"/>
               </a:ext>
             </a:extLst>
           </a:blip>
@@ -13722,7 +13764,7 @@
           <a:blip r:embed="rId6">
             <a:extLst>
               <a:ext uri="{96DAC541-7B7A-43D3-8B79-37D633B846F1}">
-                <asvg:svgBlip xmlns:asvg="http://schemas.microsoft.com/office/drawing/2016/SVG/main" xmlns="" r:embed="rId7"/>
+                <asvg:svgBlip xmlns="" xmlns:asvg="http://schemas.microsoft.com/office/drawing/2016/SVG/main" r:embed="rId7"/>
               </a:ext>
             </a:extLst>
           </a:blip>
@@ -13758,7 +13800,7 @@
           <a:blip r:embed="rId8">
             <a:extLst>
               <a:ext uri="{96DAC541-7B7A-43D3-8B79-37D633B846F1}">
-                <asvg:svgBlip xmlns:asvg="http://schemas.microsoft.com/office/drawing/2016/SVG/main" xmlns="" r:embed="rId9"/>
+                <asvg:svgBlip xmlns="" xmlns:asvg="http://schemas.microsoft.com/office/drawing/2016/SVG/main" r:embed="rId9"/>
               </a:ext>
             </a:extLst>
           </a:blip>
@@ -13794,7 +13836,7 @@
           <a:blip r:embed="rId10">
             <a:extLst>
               <a:ext uri="{96DAC541-7B7A-43D3-8B79-37D633B846F1}">
-                <asvg:svgBlip xmlns:asvg="http://schemas.microsoft.com/office/drawing/2016/SVG/main" xmlns="" r:embed="rId11"/>
+                <asvg:svgBlip xmlns="" xmlns:asvg="http://schemas.microsoft.com/office/drawing/2016/SVG/main" r:embed="rId11"/>
               </a:ext>
             </a:extLst>
           </a:blip>
@@ -13830,7 +13872,7 @@
           <a:blip r:embed="rId12">
             <a:extLst>
               <a:ext uri="{96DAC541-7B7A-43D3-8B79-37D633B846F1}">
-                <asvg:svgBlip xmlns:asvg="http://schemas.microsoft.com/office/drawing/2016/SVG/main" xmlns="" r:embed="rId14"/>
+                <asvg:svgBlip xmlns="" xmlns:asvg="http://schemas.microsoft.com/office/drawing/2016/SVG/main" r:embed="rId14"/>
               </a:ext>
             </a:extLst>
           </a:blip>
@@ -13866,7 +13908,7 @@
           <a:blip r:embed="rId15">
             <a:extLst>
               <a:ext uri="{96DAC541-7B7A-43D3-8B79-37D633B846F1}">
-                <asvg:svgBlip xmlns:asvg="http://schemas.microsoft.com/office/drawing/2016/SVG/main" xmlns="" r:embed="rId16"/>
+                <asvg:svgBlip xmlns="" xmlns:asvg="http://schemas.microsoft.com/office/drawing/2016/SVG/main" r:embed="rId16"/>
               </a:ext>
             </a:extLst>
           </a:blip>
@@ -13902,7 +13944,7 @@
           <a:blip r:embed="rId17">
             <a:extLst>
               <a:ext uri="{96DAC541-7B7A-43D3-8B79-37D633B846F1}">
-                <asvg:svgBlip xmlns:asvg="http://schemas.microsoft.com/office/drawing/2016/SVG/main" xmlns="" r:embed="rId18"/>
+                <asvg:svgBlip xmlns="" xmlns:asvg="http://schemas.microsoft.com/office/drawing/2016/SVG/main" r:embed="rId18"/>
               </a:ext>
             </a:extLst>
           </a:blip>
@@ -13938,7 +13980,7 @@
           <a:blip r:embed="rId19">
             <a:extLst>
               <a:ext uri="{96DAC541-7B7A-43D3-8B79-37D633B846F1}">
-                <asvg:svgBlip xmlns:asvg="http://schemas.microsoft.com/office/drawing/2016/SVG/main" xmlns="" r:embed="rId22"/>
+                <asvg:svgBlip xmlns="" xmlns:asvg="http://schemas.microsoft.com/office/drawing/2016/SVG/main" r:embed="rId22"/>
               </a:ext>
             </a:extLst>
           </a:blip>
@@ -13974,7 +14016,7 @@
           <a:blip r:embed="rId23">
             <a:extLst>
               <a:ext uri="{96DAC541-7B7A-43D3-8B79-37D633B846F1}">
-                <asvg:svgBlip xmlns:asvg="http://schemas.microsoft.com/office/drawing/2016/SVG/main" xmlns="" r:embed="rId24"/>
+                <asvg:svgBlip xmlns="" xmlns:asvg="http://schemas.microsoft.com/office/drawing/2016/SVG/main" r:embed="rId24"/>
               </a:ext>
             </a:extLst>
           </a:blip>
@@ -14010,7 +14052,7 @@
           <a:blip r:embed="rId25">
             <a:extLst>
               <a:ext uri="{96DAC541-7B7A-43D3-8B79-37D633B846F1}">
-                <asvg:svgBlip xmlns:asvg="http://schemas.microsoft.com/office/drawing/2016/SVG/main" xmlns="" r:embed="rId26"/>
+                <asvg:svgBlip xmlns="" xmlns:asvg="http://schemas.microsoft.com/office/drawing/2016/SVG/main" r:embed="rId26"/>
               </a:ext>
             </a:extLst>
           </a:blip>
@@ -14046,7 +14088,7 @@
           <a:blip r:embed="rId27">
             <a:extLst>
               <a:ext uri="{96DAC541-7B7A-43D3-8B79-37D633B846F1}">
-                <asvg:svgBlip xmlns:asvg="http://schemas.microsoft.com/office/drawing/2016/SVG/main" xmlns="" r:embed="rId30"/>
+                <asvg:svgBlip xmlns="" xmlns:asvg="http://schemas.microsoft.com/office/drawing/2016/SVG/main" r:embed="rId30"/>
               </a:ext>
             </a:extLst>
           </a:blip>
@@ -14247,7 +14289,7 @@
           <a:blip r:embed="rId31">
             <a:extLst>
               <a:ext uri="{96DAC541-7B7A-43D3-8B79-37D633B846F1}">
-                <asvg:svgBlip xmlns:asvg="http://schemas.microsoft.com/office/drawing/2016/SVG/main" xmlns="" r:embed="rId32"/>
+                <asvg:svgBlip xmlns="" xmlns:asvg="http://schemas.microsoft.com/office/drawing/2016/SVG/main" r:embed="rId32"/>
               </a:ext>
             </a:extLst>
           </a:blip>
@@ -14283,7 +14325,7 @@
           <a:blip r:embed="rId33">
             <a:extLst>
               <a:ext uri="{96DAC541-7B7A-43D3-8B79-37D633B846F1}">
-                <asvg:svgBlip xmlns:asvg="http://schemas.microsoft.com/office/drawing/2016/SVG/main" xmlns="" r:embed="rId34"/>
+                <asvg:svgBlip xmlns="" xmlns:asvg="http://schemas.microsoft.com/office/drawing/2016/SVG/main" r:embed="rId34"/>
               </a:ext>
             </a:extLst>
           </a:blip>
@@ -14319,7 +14361,7 @@
           <a:blip r:embed="rId35">
             <a:extLst>
               <a:ext uri="{96DAC541-7B7A-43D3-8B79-37D633B846F1}">
-                <asvg:svgBlip xmlns:asvg="http://schemas.microsoft.com/office/drawing/2016/SVG/main" xmlns="" r:embed="rId36"/>
+                <asvg:svgBlip xmlns="" xmlns:asvg="http://schemas.microsoft.com/office/drawing/2016/SVG/main" r:embed="rId36"/>
               </a:ext>
             </a:extLst>
           </a:blip>

</xml_diff>